<commit_message>
update Backup Mechanism in Developer docs
</commit_message>
<xml_diff>
--- a/docs/diagrams/BackupSequenceDiagram.pptx
+++ b/docs/diagrams/BackupSequenceDiagram.pptx
@@ -212,7 +212,7 @@
           <a:p>
             <a:fld id="{F5CC4B3F-88C1-4FFA-B1B6-F41C21DC6924}" type="datetimeFigureOut">
               <a:rPr lang="en-US" smtClean="0"/>
-              <a:t>10/23/2017</a:t>
+              <a:t>11/12/2017</a:t>
             </a:fld>
             <a:endParaRPr lang="en-US"/>
           </a:p>
@@ -658,7 +658,7 @@
           <a:p>
             <a:fld id="{78C97017-6FC3-485B-9764-EAC9E56C1D49}" type="datetimeFigureOut">
               <a:rPr lang="en-US" smtClean="0"/>
-              <a:t>10/23/2017</a:t>
+              <a:t>11/12/2017</a:t>
             </a:fld>
             <a:endParaRPr lang="en-US"/>
           </a:p>
@@ -826,7 +826,7 @@
           <a:p>
             <a:fld id="{78C97017-6FC3-485B-9764-EAC9E56C1D49}" type="datetimeFigureOut">
               <a:rPr lang="en-US" smtClean="0"/>
-              <a:t>10/23/2017</a:t>
+              <a:t>11/12/2017</a:t>
             </a:fld>
             <a:endParaRPr lang="en-US"/>
           </a:p>
@@ -1004,7 +1004,7 @@
           <a:p>
             <a:fld id="{78C97017-6FC3-485B-9764-EAC9E56C1D49}" type="datetimeFigureOut">
               <a:rPr lang="en-US" smtClean="0"/>
-              <a:t>10/23/2017</a:t>
+              <a:t>11/12/2017</a:t>
             </a:fld>
             <a:endParaRPr lang="en-US"/>
           </a:p>
@@ -1172,7 +1172,7 @@
           <a:p>
             <a:fld id="{78C97017-6FC3-485B-9764-EAC9E56C1D49}" type="datetimeFigureOut">
               <a:rPr lang="en-US" smtClean="0"/>
-              <a:t>10/23/2017</a:t>
+              <a:t>11/12/2017</a:t>
             </a:fld>
             <a:endParaRPr lang="en-US"/>
           </a:p>
@@ -1417,7 +1417,7 @@
           <a:p>
             <a:fld id="{78C97017-6FC3-485B-9764-EAC9E56C1D49}" type="datetimeFigureOut">
               <a:rPr lang="en-US" smtClean="0"/>
-              <a:t>10/23/2017</a:t>
+              <a:t>11/12/2017</a:t>
             </a:fld>
             <a:endParaRPr lang="en-US"/>
           </a:p>
@@ -1702,7 +1702,7 @@
           <a:p>
             <a:fld id="{78C97017-6FC3-485B-9764-EAC9E56C1D49}" type="datetimeFigureOut">
               <a:rPr lang="en-US" smtClean="0"/>
-              <a:t>10/23/2017</a:t>
+              <a:t>11/12/2017</a:t>
             </a:fld>
             <a:endParaRPr lang="en-US"/>
           </a:p>
@@ -2121,7 +2121,7 @@
           <a:p>
             <a:fld id="{78C97017-6FC3-485B-9764-EAC9E56C1D49}" type="datetimeFigureOut">
               <a:rPr lang="en-US" smtClean="0"/>
-              <a:t>10/23/2017</a:t>
+              <a:t>11/12/2017</a:t>
             </a:fld>
             <a:endParaRPr lang="en-US"/>
           </a:p>
@@ -2238,7 +2238,7 @@
           <a:p>
             <a:fld id="{78C97017-6FC3-485B-9764-EAC9E56C1D49}" type="datetimeFigureOut">
               <a:rPr lang="en-US" smtClean="0"/>
-              <a:t>10/23/2017</a:t>
+              <a:t>11/12/2017</a:t>
             </a:fld>
             <a:endParaRPr lang="en-US"/>
           </a:p>
@@ -2333,7 +2333,7 @@
           <a:p>
             <a:fld id="{78C97017-6FC3-485B-9764-EAC9E56C1D49}" type="datetimeFigureOut">
               <a:rPr lang="en-US" smtClean="0"/>
-              <a:t>10/23/2017</a:t>
+              <a:t>11/12/2017</a:t>
             </a:fld>
             <a:endParaRPr lang="en-US"/>
           </a:p>
@@ -2608,7 +2608,7 @@
           <a:p>
             <a:fld id="{78C97017-6FC3-485B-9764-EAC9E56C1D49}" type="datetimeFigureOut">
               <a:rPr lang="en-US" smtClean="0"/>
-              <a:t>10/23/2017</a:t>
+              <a:t>11/12/2017</a:t>
             </a:fld>
             <a:endParaRPr lang="en-US"/>
           </a:p>
@@ -2860,7 +2860,7 @@
           <a:p>
             <a:fld id="{78C97017-6FC3-485B-9764-EAC9E56C1D49}" type="datetimeFigureOut">
               <a:rPr lang="en-US" smtClean="0"/>
-              <a:t>10/23/2017</a:t>
+              <a:t>11/12/2017</a:t>
             </a:fld>
             <a:endParaRPr lang="en-US"/>
           </a:p>
@@ -3071,7 +3071,7 @@
           <a:p>
             <a:fld id="{78C97017-6FC3-485B-9764-EAC9E56C1D49}" type="datetimeFigureOut">
               <a:rPr lang="en-US" smtClean="0"/>
-              <a:t>10/23/2017</a:t>
+              <a:t>11/12/2017</a:t>
             </a:fld>
             <a:endParaRPr lang="en-US"/>
           </a:p>
@@ -3460,7 +3460,7 @@
         </p:nvSpPr>
         <p:spPr>
           <a:xfrm>
-            <a:off x="2156936" y="2531212"/>
+            <a:off x="3147536" y="2607412"/>
             <a:ext cx="222832" cy="244919"/>
           </a:xfrm>
           <a:prstGeom prst="rect">
@@ -3521,7 +3521,7 @@
         </p:nvSpPr>
         <p:spPr>
           <a:xfrm>
-            <a:off x="2473159" y="3506020"/>
+            <a:off x="3463759" y="3582220"/>
             <a:ext cx="222832" cy="94200"/>
           </a:xfrm>
           <a:prstGeom prst="rect">
@@ -3582,7 +3582,7 @@
         </p:nvSpPr>
         <p:spPr>
           <a:xfrm>
-            <a:off x="2473708" y="2652144"/>
+            <a:off x="3464308" y="2728344"/>
             <a:ext cx="222832" cy="277272"/>
           </a:xfrm>
           <a:prstGeom prst="rect">
@@ -3643,7 +3643,7 @@
         </p:nvSpPr>
         <p:spPr>
           <a:xfrm>
-            <a:off x="2315322" y="2398359"/>
+            <a:off x="3305922" y="2474559"/>
             <a:ext cx="222832" cy="251837"/>
           </a:xfrm>
           <a:prstGeom prst="rect">
@@ -3698,8 +3698,8 @@
         </p:nvSpPr>
         <p:spPr>
           <a:xfrm>
-            <a:off x="0" y="76200"/>
-            <a:ext cx="6781800" cy="4724400"/>
+            <a:off x="1600200" y="274117"/>
+            <a:ext cx="7010400" cy="6202878"/>
           </a:xfrm>
           <a:prstGeom prst="roundRect">
             <a:avLst>
@@ -3752,73 +3752,6 @@
           </a:p>
         </p:txBody>
       </p:sp>
-      <p:sp>
-        <p:nvSpPr>
-          <p:cNvPr id="2" name="Rectangle 62"/>
-          <p:cNvSpPr/>
-          <p:nvPr/>
-        </p:nvSpPr>
-        <p:spPr>
-          <a:xfrm>
-            <a:off x="1568945" y="596310"/>
-            <a:ext cx="1631455" cy="346760"/>
-          </a:xfrm>
-          <a:prstGeom prst="rect">
-            <a:avLst/>
-          </a:prstGeom>
-          <a:solidFill>
-            <a:srgbClr val="E46C0A"/>
-          </a:solidFill>
-          <a:ln w="19050">
-            <a:solidFill>
-              <a:srgbClr val="E46C0A"/>
-            </a:solidFill>
-          </a:ln>
-          <a:effectLst/>
-        </p:spPr>
-        <p:style>
-          <a:lnRef idx="1">
-            <a:schemeClr val="accent2"/>
-          </a:lnRef>
-          <a:fillRef idx="2">
-            <a:schemeClr val="accent2"/>
-          </a:fillRef>
-          <a:effectRef idx="1">
-            <a:schemeClr val="accent2"/>
-          </a:effectRef>
-          <a:fontRef idx="minor">
-            <a:schemeClr val="dk1"/>
-          </a:fontRef>
-        </p:style>
-        <p:txBody>
-          <a:bodyPr rtlCol="0" anchor="ctr"/>
-          <a:lstStyle/>
-          <a:p>
-            <a:pPr algn="ctr"/>
-            <a:r>
-              <a:rPr lang="en-US" sz="1600" dirty="0">
-                <a:solidFill>
-                  <a:schemeClr val="bg1"/>
-                </a:solidFill>
-              </a:rPr>
-              <a:t>:</a:t>
-            </a:r>
-            <a:r>
-              <a:rPr lang="en-US" sz="1600" dirty="0" err="1">
-                <a:solidFill>
-                  <a:schemeClr val="bg1"/>
-                </a:solidFill>
-              </a:rPr>
-              <a:t>StorageManager</a:t>
-            </a:r>
-            <a:endParaRPr lang="en-SG" sz="1600" dirty="0">
-              <a:solidFill>
-                <a:schemeClr val="bg1"/>
-              </a:solidFill>
-            </a:endParaRPr>
-          </a:p>
-        </p:txBody>
-      </p:sp>
       <p:cxnSp>
         <p:nvCxnSpPr>
           <p:cNvPr id="5" name="Straight Connector 4"/>
@@ -3829,8 +3762,8 @@
         </p:nvCxnSpPr>
         <p:spPr>
           <a:xfrm flipH="1">
-            <a:off x="2288039" y="959981"/>
-            <a:ext cx="8720" cy="3764419"/>
+            <a:off x="3270013" y="1036181"/>
+            <a:ext cx="17346" cy="5593219"/>
           </a:xfrm>
           <a:prstGeom prst="line">
             <a:avLst/>
@@ -3866,8 +3799,8 @@
         </p:nvSpPr>
         <p:spPr>
           <a:xfrm>
-            <a:off x="2224751" y="1310675"/>
-            <a:ext cx="169294" cy="3185125"/>
+            <a:off x="3158657" y="923417"/>
+            <a:ext cx="225988" cy="5389905"/>
           </a:xfrm>
           <a:prstGeom prst="rect">
             <a:avLst/>
@@ -3911,73 +3844,6 @@
           </a:p>
         </p:txBody>
       </p:sp>
-      <p:sp>
-        <p:nvSpPr>
-          <p:cNvPr id="16" name="Rectangle 62"/>
-          <p:cNvSpPr/>
-          <p:nvPr/>
-        </p:nvSpPr>
-        <p:spPr>
-          <a:xfrm>
-            <a:off x="4122988" y="475386"/>
-            <a:ext cx="1287212" cy="467684"/>
-          </a:xfrm>
-          <a:prstGeom prst="rect">
-            <a:avLst/>
-          </a:prstGeom>
-          <a:solidFill>
-            <a:srgbClr val="E46C0A"/>
-          </a:solidFill>
-          <a:ln w="19050">
-            <a:solidFill>
-              <a:srgbClr val="E46C0A"/>
-            </a:solidFill>
-          </a:ln>
-          <a:effectLst/>
-        </p:spPr>
-        <p:style>
-          <a:lnRef idx="1">
-            <a:schemeClr val="accent2"/>
-          </a:lnRef>
-          <a:fillRef idx="2">
-            <a:schemeClr val="accent2"/>
-          </a:fillRef>
-          <a:effectRef idx="1">
-            <a:schemeClr val="accent2"/>
-          </a:effectRef>
-          <a:fontRef idx="minor">
-            <a:schemeClr val="dk1"/>
-          </a:fontRef>
-        </p:style>
-        <p:txBody>
-          <a:bodyPr rtlCol="0" anchor="ctr"/>
-          <a:lstStyle/>
-          <a:p>
-            <a:pPr algn="ctr"/>
-            <a:r>
-              <a:rPr lang="en-US" sz="1600" dirty="0">
-                <a:solidFill>
-                  <a:schemeClr val="bg1"/>
-                </a:solidFill>
-              </a:rPr>
-              <a:t>:</a:t>
-            </a:r>
-            <a:r>
-              <a:rPr lang="en-US" sz="1600" dirty="0" err="1">
-                <a:solidFill>
-                  <a:schemeClr val="bg1"/>
-                </a:solidFill>
-              </a:rPr>
-              <a:t>XmlAddressBookStorage</a:t>
-            </a:r>
-            <a:endParaRPr lang="en-SG" sz="1600" dirty="0">
-              <a:solidFill>
-                <a:schemeClr val="bg1"/>
-              </a:solidFill>
-            </a:endParaRPr>
-          </a:p>
-        </p:txBody>
-      </p:sp>
       <p:cxnSp>
         <p:nvCxnSpPr>
           <p:cNvPr id="17" name="Straight Connector 16"/>
@@ -3988,8 +3854,8 @@
         </p:nvCxnSpPr>
         <p:spPr>
           <a:xfrm>
-            <a:off x="4736387" y="959981"/>
-            <a:ext cx="0" cy="1322728"/>
+            <a:off x="5910128" y="923417"/>
+            <a:ext cx="0" cy="2072674"/>
           </a:xfrm>
           <a:prstGeom prst="line">
             <a:avLst/>
@@ -4025,8 +3891,8 @@
         </p:nvSpPr>
         <p:spPr>
           <a:xfrm>
-            <a:off x="4650750" y="1348080"/>
-            <a:ext cx="154408" cy="767790"/>
+            <a:off x="5790238" y="1962905"/>
+            <a:ext cx="222832" cy="878142"/>
           </a:xfrm>
           <a:prstGeom prst="rect">
             <a:avLst/>
@@ -4078,7 +3944,7 @@
         </p:nvCxnSpPr>
         <p:spPr>
           <a:xfrm>
-            <a:off x="449094" y="738164"/>
+            <a:off x="1439694" y="914400"/>
             <a:ext cx="1119851" cy="0"/>
           </a:xfrm>
           <a:prstGeom prst="straightConnector1">
@@ -4114,8 +3980,8 @@
         </p:nvSpPr>
         <p:spPr>
           <a:xfrm>
-            <a:off x="152400" y="523843"/>
-            <a:ext cx="1306396" cy="184666"/>
+            <a:off x="1273250" y="701092"/>
+            <a:ext cx="1170337" cy="169277"/>
           </a:xfrm>
           <a:prstGeom prst="rect">
             <a:avLst/>
@@ -4130,7 +3996,7 @@
           <a:p>
             <a:pPr algn="r"/>
             <a:r>
-              <a:rPr lang="en-US" sz="1200" dirty="0" err="1">
+              <a:rPr lang="en-US" sz="1100" dirty="0" err="1">
                 <a:solidFill>
                   <a:schemeClr val="accent6">
                     <a:lumMod val="75000"/>
@@ -4140,7 +4006,7 @@
               <a:t>StorageManager</a:t>
             </a:r>
             <a:r>
-              <a:rPr lang="en-US" sz="1200" dirty="0">
+              <a:rPr lang="en-US" sz="1100" dirty="0">
                 <a:solidFill>
                   <a:schemeClr val="accent6">
                     <a:lumMod val="75000"/>
@@ -4157,13 +4023,14 @@
           <p:cNvPr id="35" name="Straight Arrow Connector 34"/>
           <p:cNvCxnSpPr>
             <a:cxnSpLocks/>
+            <a:endCxn id="18" idx="2"/>
           </p:cNvCxnSpPr>
           <p:nvPr/>
         </p:nvCxnSpPr>
         <p:spPr>
           <a:xfrm>
-            <a:off x="2377151" y="2185964"/>
-            <a:ext cx="2348067" cy="0"/>
+            <a:off x="3571436" y="2838468"/>
+            <a:ext cx="2330218" cy="2579"/>
           </a:xfrm>
           <a:prstGeom prst="straightConnector1">
             <a:avLst/>
@@ -4175,816 +4042,6 @@
             <a:prstDash val="sysDash"/>
             <a:headEnd type="arrow" w="med" len="med"/>
             <a:tailEnd type="none" w="med" len="med"/>
-          </a:ln>
-        </p:spPr>
-        <p:style>
-          <a:lnRef idx="1">
-            <a:schemeClr val="accent1"/>
-          </a:lnRef>
-          <a:fillRef idx="0">
-            <a:schemeClr val="accent1"/>
-          </a:fillRef>
-          <a:effectRef idx="0">
-            <a:schemeClr val="accent1"/>
-          </a:effectRef>
-          <a:fontRef idx="minor">
-            <a:schemeClr val="tx1"/>
-          </a:fontRef>
-        </p:style>
-      </p:cxnSp>
-      <p:sp>
-        <p:nvSpPr>
-          <p:cNvPr id="80" name="TextBox 79"/>
-          <p:cNvSpPr txBox="1"/>
-          <p:nvPr/>
-        </p:nvSpPr>
-        <p:spPr>
-          <a:xfrm>
-            <a:off x="2288039" y="1173255"/>
-            <a:ext cx="1899551" cy="215444"/>
-          </a:xfrm>
-          <a:prstGeom prst="rect">
-            <a:avLst/>
-          </a:prstGeom>
-          <a:noFill/>
-        </p:spPr>
-        <p:txBody>
-          <a:bodyPr wrap="square" lIns="0" tIns="0" rIns="0" bIns="0" rtlCol="0">
-            <a:spAutoFit/>
-          </a:bodyPr>
-          <a:lstStyle>
-            <a:defPPr>
-              <a:defRPr lang="en-US"/>
-            </a:defPPr>
-            <a:lvl1pPr algn="r">
-              <a:defRPr sz="1400">
-                <a:solidFill>
-                  <a:srgbClr val="0070C0"/>
-                </a:solidFill>
-              </a:defRPr>
-            </a:lvl1pPr>
-          </a:lstStyle>
-          <a:p>
-            <a:r>
-              <a:rPr lang="en-US" sz="1000" dirty="0" err="1">
-                <a:solidFill>
-                  <a:schemeClr val="accent6">
-                    <a:lumMod val="75000"/>
-                  </a:schemeClr>
-                </a:solidFill>
-              </a:rPr>
-              <a:t>readAddressBook</a:t>
-            </a:r>
-            <a:r>
-              <a:rPr lang="en-US" dirty="0">
-                <a:solidFill>
-                  <a:schemeClr val="accent6">
-                    <a:lumMod val="75000"/>
-                  </a:schemeClr>
-                </a:solidFill>
-              </a:rPr>
-              <a:t>()</a:t>
-            </a:r>
-          </a:p>
-        </p:txBody>
-      </p:sp>
-      <p:sp>
-        <p:nvSpPr>
-          <p:cNvPr id="93" name="TextBox 92"/>
-          <p:cNvSpPr txBox="1"/>
-          <p:nvPr/>
-        </p:nvSpPr>
-        <p:spPr>
-          <a:xfrm>
-            <a:off x="2301122" y="1986960"/>
-            <a:ext cx="1897285" cy="153888"/>
-          </a:xfrm>
-          <a:prstGeom prst="rect">
-            <a:avLst/>
-          </a:prstGeom>
-          <a:noFill/>
-        </p:spPr>
-        <p:txBody>
-          <a:bodyPr wrap="square" lIns="0" tIns="0" rIns="0" bIns="0" rtlCol="0">
-            <a:spAutoFit/>
-          </a:bodyPr>
-          <a:lstStyle>
-            <a:defPPr>
-              <a:defRPr lang="en-US"/>
-            </a:defPPr>
-            <a:lvl1pPr algn="r">
-              <a:defRPr sz="1400">
-                <a:solidFill>
-                  <a:srgbClr val="0070C0"/>
-                </a:solidFill>
-              </a:defRPr>
-            </a:lvl1pPr>
-          </a:lstStyle>
-          <a:p>
-            <a:r>
-              <a:rPr lang="en-US" sz="1000" dirty="0" err="1">
-                <a:solidFill>
-                  <a:schemeClr val="accent6">
-                    <a:lumMod val="75000"/>
-                  </a:schemeClr>
-                </a:solidFill>
-              </a:rPr>
-              <a:t>addressBookOptional</a:t>
-            </a:r>
-            <a:endParaRPr lang="en-US" sz="1000" dirty="0">
-              <a:solidFill>
-                <a:schemeClr val="accent6">
-                  <a:lumMod val="75000"/>
-                </a:schemeClr>
-              </a:solidFill>
-            </a:endParaRPr>
-          </a:p>
-        </p:txBody>
-      </p:sp>
-      <p:cxnSp>
-        <p:nvCxnSpPr>
-          <p:cNvPr id="67" name="Straight Arrow Connector 66">
-            <a:extLst>
-              <a:ext uri="{FF2B5EF4-FFF2-40B4-BE49-F238E27FC236}">
-                <a16:creationId xmlns:a16="http://schemas.microsoft.com/office/drawing/2014/main" id="{D881596E-177C-4FDC-8E60-CAB90B3D5FAB}"/>
-              </a:ext>
-            </a:extLst>
-          </p:cNvPr>
-          <p:cNvCxnSpPr>
-            <a:cxnSpLocks/>
-          </p:cNvCxnSpPr>
-          <p:nvPr/>
-        </p:nvCxnSpPr>
-        <p:spPr>
-          <a:xfrm>
-            <a:off x="2394045" y="1416282"/>
-            <a:ext cx="2256705" cy="1"/>
-          </a:xfrm>
-          <a:prstGeom prst="straightConnector1">
-            <a:avLst/>
-          </a:prstGeom>
-          <a:ln w="19050">
-            <a:solidFill>
-              <a:srgbClr val="E46C0A"/>
-            </a:solidFill>
-            <a:tailEnd type="arrow"/>
-          </a:ln>
-        </p:spPr>
-        <p:style>
-          <a:lnRef idx="1">
-            <a:schemeClr val="accent1"/>
-          </a:lnRef>
-          <a:fillRef idx="0">
-            <a:schemeClr val="accent1"/>
-          </a:fillRef>
-          <a:effectRef idx="0">
-            <a:schemeClr val="accent1"/>
-          </a:effectRef>
-          <a:fontRef idx="minor">
-            <a:schemeClr val="tx1"/>
-          </a:fontRef>
-        </p:style>
-      </p:cxnSp>
-      <p:sp>
-        <p:nvSpPr>
-          <p:cNvPr id="117" name="Rectangle 116">
-            <a:extLst>
-              <a:ext uri="{FF2B5EF4-FFF2-40B4-BE49-F238E27FC236}">
-                <a16:creationId xmlns:a16="http://schemas.microsoft.com/office/drawing/2014/main" id="{3B4C775E-3EA5-4DAB-8185-B313D1DE2DC6}"/>
-              </a:ext>
-            </a:extLst>
-          </p:cNvPr>
-          <p:cNvSpPr/>
-          <p:nvPr/>
-        </p:nvSpPr>
-        <p:spPr>
-          <a:xfrm>
-            <a:off x="2322458" y="2753020"/>
-            <a:ext cx="222832" cy="952502"/>
-          </a:xfrm>
-          <a:prstGeom prst="rect">
-            <a:avLst/>
-          </a:prstGeom>
-          <a:solidFill>
-            <a:srgbClr val="E46C0A"/>
-          </a:solidFill>
-          <a:ln>
-            <a:solidFill>
-              <a:schemeClr val="accent6">
-                <a:lumMod val="50000"/>
-              </a:schemeClr>
-            </a:solidFill>
-          </a:ln>
-          <a:effectLst/>
-        </p:spPr>
-        <p:style>
-          <a:lnRef idx="1">
-            <a:schemeClr val="accent3"/>
-          </a:lnRef>
-          <a:fillRef idx="2">
-            <a:schemeClr val="accent3"/>
-          </a:fillRef>
-          <a:effectRef idx="1">
-            <a:schemeClr val="accent3"/>
-          </a:effectRef>
-          <a:fontRef idx="minor">
-            <a:schemeClr val="dk1"/>
-          </a:fontRef>
-        </p:style>
-        <p:txBody>
-          <a:bodyPr rtlCol="0" anchor="ctr"/>
-          <a:lstStyle/>
-          <a:p>
-            <a:pPr algn="ctr"/>
-            <a:endParaRPr lang="en-SG" sz="1400" dirty="0">
-              <a:solidFill>
-                <a:schemeClr val="accent6">
-                  <a:lumMod val="75000"/>
-                </a:schemeClr>
-              </a:solidFill>
-            </a:endParaRPr>
-          </a:p>
-        </p:txBody>
-      </p:sp>
-      <p:cxnSp>
-        <p:nvCxnSpPr>
-          <p:cNvPr id="118" name="Straight Arrow Connector 117">
-            <a:extLst>
-              <a:ext uri="{FF2B5EF4-FFF2-40B4-BE49-F238E27FC236}">
-                <a16:creationId xmlns:a16="http://schemas.microsoft.com/office/drawing/2014/main" id="{E70CFE4D-9EAF-44B5-A8AC-B651291DD14E}"/>
-              </a:ext>
-            </a:extLst>
-          </p:cNvPr>
-          <p:cNvCxnSpPr>
-            <a:cxnSpLocks/>
-            <a:stCxn id="40" idx="3"/>
-          </p:cNvCxnSpPr>
-          <p:nvPr/>
-        </p:nvCxnSpPr>
-        <p:spPr>
-          <a:xfrm>
-            <a:off x="2379768" y="2653672"/>
-            <a:ext cx="155953" cy="97385"/>
-          </a:xfrm>
-          <a:prstGeom prst="curvedConnector3">
-            <a:avLst>
-              <a:gd name="adj1" fmla="val 320615"/>
-            </a:avLst>
-          </a:prstGeom>
-          <a:ln w="19050">
-            <a:solidFill>
-              <a:srgbClr val="E46C0A"/>
-            </a:solidFill>
-            <a:tailEnd type="arrow"/>
-          </a:ln>
-        </p:spPr>
-        <p:style>
-          <a:lnRef idx="1">
-            <a:schemeClr val="accent1"/>
-          </a:lnRef>
-          <a:fillRef idx="0">
-            <a:schemeClr val="accent1"/>
-          </a:fillRef>
-          <a:effectRef idx="0">
-            <a:schemeClr val="accent1"/>
-          </a:effectRef>
-          <a:fontRef idx="minor">
-            <a:schemeClr val="tx1"/>
-          </a:fontRef>
-        </p:style>
-      </p:cxnSp>
-      <p:sp>
-        <p:nvSpPr>
-          <p:cNvPr id="127" name="TextBox 126">
-            <a:extLst>
-              <a:ext uri="{FF2B5EF4-FFF2-40B4-BE49-F238E27FC236}">
-                <a16:creationId xmlns:a16="http://schemas.microsoft.com/office/drawing/2014/main" id="{A10F7EE0-09D8-40EA-B4E9-235E093070E8}"/>
-              </a:ext>
-            </a:extLst>
-          </p:cNvPr>
-          <p:cNvSpPr txBox="1"/>
-          <p:nvPr/>
-        </p:nvSpPr>
-        <p:spPr>
-          <a:xfrm>
-            <a:off x="2910104" y="2641810"/>
-            <a:ext cx="2818905" cy="153888"/>
-          </a:xfrm>
-          <a:prstGeom prst="rect">
-            <a:avLst/>
-          </a:prstGeom>
-          <a:noFill/>
-        </p:spPr>
-        <p:txBody>
-          <a:bodyPr wrap="square" lIns="0" tIns="0" rIns="0" bIns="0" rtlCol="0">
-            <a:spAutoFit/>
-          </a:bodyPr>
-          <a:lstStyle>
-            <a:defPPr>
-              <a:defRPr lang="en-US"/>
-            </a:defPPr>
-            <a:lvl1pPr algn="r">
-              <a:defRPr sz="1400">
-                <a:solidFill>
-                  <a:srgbClr val="0070C0"/>
-                </a:solidFill>
-              </a:defRPr>
-            </a:lvl1pPr>
-          </a:lstStyle>
-          <a:p>
-            <a:pPr algn="l"/>
-            <a:r>
-              <a:rPr lang="en-US" sz="1000" dirty="0" err="1">
-                <a:solidFill>
-                  <a:schemeClr val="accent6">
-                    <a:lumMod val="75000"/>
-                  </a:schemeClr>
-                </a:solidFill>
-              </a:rPr>
-              <a:t>backupAddressBook</a:t>
-            </a:r>
-            <a:r>
-              <a:rPr lang="en-US" sz="1000" dirty="0">
-                <a:solidFill>
-                  <a:schemeClr val="accent6">
-                    <a:lumMod val="75000"/>
-                  </a:schemeClr>
-                </a:solidFill>
-              </a:rPr>
-              <a:t>(</a:t>
-            </a:r>
-            <a:r>
-              <a:rPr lang="en-US" sz="1000" dirty="0" err="1">
-                <a:solidFill>
-                  <a:schemeClr val="accent6">
-                    <a:lumMod val="75000"/>
-                  </a:schemeClr>
-                </a:solidFill>
-              </a:rPr>
-              <a:t>addressBookOptional.get</a:t>
-            </a:r>
-            <a:r>
-              <a:rPr lang="en-US" sz="1000" dirty="0">
-                <a:solidFill>
-                  <a:schemeClr val="accent6">
-                    <a:lumMod val="75000"/>
-                  </a:schemeClr>
-                </a:solidFill>
-              </a:rPr>
-              <a:t>())</a:t>
-            </a:r>
-          </a:p>
-        </p:txBody>
-      </p:sp>
-      <p:sp>
-        <p:nvSpPr>
-          <p:cNvPr id="130" name="Rectangle 129">
-            <a:extLst>
-              <a:ext uri="{FF2B5EF4-FFF2-40B4-BE49-F238E27FC236}">
-                <a16:creationId xmlns:a16="http://schemas.microsoft.com/office/drawing/2014/main" id="{88D6C759-D6A0-4A8F-BF6E-F0A4E52B88D6}"/>
-              </a:ext>
-            </a:extLst>
-          </p:cNvPr>
-          <p:cNvSpPr/>
-          <p:nvPr/>
-        </p:nvSpPr>
-        <p:spPr>
-          <a:xfrm>
-            <a:off x="2473708" y="3008575"/>
-            <a:ext cx="222832" cy="594670"/>
-          </a:xfrm>
-          <a:prstGeom prst="rect">
-            <a:avLst/>
-          </a:prstGeom>
-          <a:solidFill>
-            <a:srgbClr val="E46C0A"/>
-          </a:solidFill>
-          <a:ln>
-            <a:solidFill>
-              <a:schemeClr val="accent6">
-                <a:lumMod val="50000"/>
-              </a:schemeClr>
-            </a:solidFill>
-          </a:ln>
-          <a:effectLst/>
-        </p:spPr>
-        <p:style>
-          <a:lnRef idx="1">
-            <a:schemeClr val="accent3"/>
-          </a:lnRef>
-          <a:fillRef idx="2">
-            <a:schemeClr val="accent3"/>
-          </a:fillRef>
-          <a:effectRef idx="1">
-            <a:schemeClr val="accent3"/>
-          </a:effectRef>
-          <a:fontRef idx="minor">
-            <a:schemeClr val="dk1"/>
-          </a:fontRef>
-        </p:style>
-        <p:txBody>
-          <a:bodyPr rtlCol="0" anchor="ctr"/>
-          <a:lstStyle/>
-          <a:p>
-            <a:pPr algn="ctr"/>
-            <a:endParaRPr lang="en-SG" sz="1400" dirty="0">
-              <a:solidFill>
-                <a:schemeClr val="accent6">
-                  <a:lumMod val="75000"/>
-                </a:schemeClr>
-              </a:solidFill>
-            </a:endParaRPr>
-          </a:p>
-        </p:txBody>
-      </p:sp>
-      <p:sp>
-        <p:nvSpPr>
-          <p:cNvPr id="140" name="TextBox 139">
-            <a:extLst>
-              <a:ext uri="{FF2B5EF4-FFF2-40B4-BE49-F238E27FC236}">
-                <a16:creationId xmlns:a16="http://schemas.microsoft.com/office/drawing/2014/main" id="{7CE71ED6-4ECF-4F83-BBF2-3C165FAB5622}"/>
-              </a:ext>
-            </a:extLst>
-          </p:cNvPr>
-          <p:cNvSpPr txBox="1"/>
-          <p:nvPr/>
-        </p:nvSpPr>
-        <p:spPr>
-          <a:xfrm>
-            <a:off x="3107190" y="2844469"/>
-            <a:ext cx="3149788" cy="153888"/>
-          </a:xfrm>
-          <a:prstGeom prst="rect">
-            <a:avLst/>
-          </a:prstGeom>
-          <a:noFill/>
-        </p:spPr>
-        <p:txBody>
-          <a:bodyPr wrap="square" lIns="0" tIns="0" rIns="0" bIns="0" rtlCol="0">
-            <a:spAutoFit/>
-          </a:bodyPr>
-          <a:lstStyle>
-            <a:defPPr>
-              <a:defRPr lang="en-US"/>
-            </a:defPPr>
-            <a:lvl1pPr algn="r">
-              <a:defRPr sz="1400">
-                <a:solidFill>
-                  <a:srgbClr val="0070C0"/>
-                </a:solidFill>
-              </a:defRPr>
-            </a:lvl1pPr>
-          </a:lstStyle>
-          <a:p>
-            <a:pPr algn="l"/>
-            <a:r>
-              <a:rPr lang="en-US" sz="1000" dirty="0" err="1">
-                <a:solidFill>
-                  <a:schemeClr val="accent6">
-                    <a:lumMod val="75000"/>
-                  </a:schemeClr>
-                </a:solidFill>
-              </a:rPr>
-              <a:t>saveAddressBook</a:t>
-            </a:r>
-            <a:r>
-              <a:rPr lang="en-US" sz="1000" dirty="0">
-                <a:solidFill>
-                  <a:schemeClr val="accent6">
-                    <a:lumMod val="75000"/>
-                  </a:schemeClr>
-                </a:solidFill>
-              </a:rPr>
-              <a:t>()</a:t>
-            </a:r>
-          </a:p>
-        </p:txBody>
-      </p:sp>
-      <p:sp>
-        <p:nvSpPr>
-          <p:cNvPr id="147" name="Rectangle 146">
-            <a:extLst>
-              <a:ext uri="{FF2B5EF4-FFF2-40B4-BE49-F238E27FC236}">
-                <a16:creationId xmlns:a16="http://schemas.microsoft.com/office/drawing/2014/main" id="{65FCBB28-2B62-4BB7-AAA4-49D65A53898A}"/>
-              </a:ext>
-            </a:extLst>
-          </p:cNvPr>
-          <p:cNvSpPr/>
-          <p:nvPr/>
-        </p:nvSpPr>
-        <p:spPr>
-          <a:xfrm>
-            <a:off x="1295400" y="2408644"/>
-            <a:ext cx="5029200" cy="1543507"/>
-          </a:xfrm>
-          <a:prstGeom prst="rect">
-            <a:avLst/>
-          </a:prstGeom>
-          <a:noFill/>
-          <a:ln>
-            <a:solidFill>
-              <a:schemeClr val="accent6">
-                <a:lumMod val="50000"/>
-              </a:schemeClr>
-            </a:solidFill>
-          </a:ln>
-        </p:spPr>
-        <p:style>
-          <a:lnRef idx="2">
-            <a:schemeClr val="accent1">
-              <a:shade val="50000"/>
-            </a:schemeClr>
-          </a:lnRef>
-          <a:fillRef idx="1">
-            <a:schemeClr val="accent1"/>
-          </a:fillRef>
-          <a:effectRef idx="0">
-            <a:schemeClr val="accent1"/>
-          </a:effectRef>
-          <a:fontRef idx="minor">
-            <a:schemeClr val="lt1"/>
-          </a:fontRef>
-        </p:style>
-        <p:txBody>
-          <a:bodyPr rtlCol="0" anchor="ctr"/>
-          <a:lstStyle/>
-          <a:p>
-            <a:pPr algn="ctr"/>
-            <a:endParaRPr lang="en-SG"/>
-          </a:p>
-        </p:txBody>
-      </p:sp>
-      <p:sp>
-        <p:nvSpPr>
-          <p:cNvPr id="148" name="Rectangle: Single Corner Snipped 147">
-            <a:extLst>
-              <a:ext uri="{FF2B5EF4-FFF2-40B4-BE49-F238E27FC236}">
-                <a16:creationId xmlns:a16="http://schemas.microsoft.com/office/drawing/2014/main" id="{C0B51C55-7A8B-45B8-8C02-18FC4A26E143}"/>
-              </a:ext>
-            </a:extLst>
-          </p:cNvPr>
-          <p:cNvSpPr/>
-          <p:nvPr/>
-        </p:nvSpPr>
-        <p:spPr>
-          <a:xfrm rot="10800000" flipH="1">
-            <a:off x="1295401" y="2407607"/>
-            <a:ext cx="457199" cy="275919"/>
-          </a:xfrm>
-          <a:prstGeom prst="snip1Rect">
-            <a:avLst/>
-          </a:prstGeom>
-          <a:noFill/>
-          <a:ln>
-            <a:solidFill>
-              <a:schemeClr val="accent6">
-                <a:lumMod val="50000"/>
-              </a:schemeClr>
-            </a:solidFill>
-          </a:ln>
-        </p:spPr>
-        <p:style>
-          <a:lnRef idx="2">
-            <a:schemeClr val="accent1">
-              <a:shade val="50000"/>
-            </a:schemeClr>
-          </a:lnRef>
-          <a:fillRef idx="1">
-            <a:schemeClr val="accent1"/>
-          </a:fillRef>
-          <a:effectRef idx="0">
-            <a:schemeClr val="accent1"/>
-          </a:effectRef>
-          <a:fontRef idx="minor">
-            <a:schemeClr val="lt1"/>
-          </a:fontRef>
-        </p:style>
-        <p:txBody>
-          <a:bodyPr rtlCol="0" anchor="ctr"/>
-          <a:lstStyle/>
-          <a:p>
-            <a:pPr algn="ctr"/>
-            <a:endParaRPr lang="en-SG" dirty="0"/>
-          </a:p>
-        </p:txBody>
-      </p:sp>
-      <p:sp>
-        <p:nvSpPr>
-          <p:cNvPr id="149" name="TextBox 148">
-            <a:extLst>
-              <a:ext uri="{FF2B5EF4-FFF2-40B4-BE49-F238E27FC236}">
-                <a16:creationId xmlns:a16="http://schemas.microsoft.com/office/drawing/2014/main" id="{4020EE11-0984-4CCD-91F3-C88BD9B027EC}"/>
-              </a:ext>
-            </a:extLst>
-          </p:cNvPr>
-          <p:cNvSpPr txBox="1"/>
-          <p:nvPr/>
-        </p:nvSpPr>
-        <p:spPr>
-          <a:xfrm>
-            <a:off x="1415667" y="2468083"/>
-            <a:ext cx="336933" cy="215444"/>
-          </a:xfrm>
-          <a:prstGeom prst="rect">
-            <a:avLst/>
-          </a:prstGeom>
-          <a:noFill/>
-        </p:spPr>
-        <p:txBody>
-          <a:bodyPr wrap="square" lIns="0" tIns="0" rIns="0" bIns="0" rtlCol="0">
-            <a:spAutoFit/>
-          </a:bodyPr>
-          <a:lstStyle>
-            <a:defPPr>
-              <a:defRPr lang="en-US"/>
-            </a:defPPr>
-            <a:lvl1pPr algn="r">
-              <a:defRPr sz="1400">
-                <a:solidFill>
-                  <a:srgbClr val="0070C0"/>
-                </a:solidFill>
-              </a:defRPr>
-            </a:lvl1pPr>
-          </a:lstStyle>
-          <a:p>
-            <a:pPr algn="l"/>
-            <a:r>
-              <a:rPr lang="en-US" dirty="0">
-                <a:solidFill>
-                  <a:schemeClr val="accent6">
-                    <a:lumMod val="50000"/>
-                  </a:schemeClr>
-                </a:solidFill>
-              </a:rPr>
-              <a:t>opt</a:t>
-            </a:r>
-          </a:p>
-        </p:txBody>
-      </p:sp>
-      <p:sp>
-        <p:nvSpPr>
-          <p:cNvPr id="151" name="TextBox 150">
-            <a:extLst>
-              <a:ext uri="{FF2B5EF4-FFF2-40B4-BE49-F238E27FC236}">
-                <a16:creationId xmlns:a16="http://schemas.microsoft.com/office/drawing/2014/main" id="{BB055AC5-0EB8-4412-BD3E-A3AAE7D7EC30}"/>
-              </a:ext>
-            </a:extLst>
-          </p:cNvPr>
-          <p:cNvSpPr txBox="1"/>
-          <p:nvPr/>
-        </p:nvSpPr>
-        <p:spPr>
-          <a:xfrm>
-            <a:off x="2735275" y="2426401"/>
-            <a:ext cx="2818905" cy="184666"/>
-          </a:xfrm>
-          <a:prstGeom prst="rect">
-            <a:avLst/>
-          </a:prstGeom>
-          <a:noFill/>
-        </p:spPr>
-        <p:txBody>
-          <a:bodyPr wrap="square" lIns="0" tIns="0" rIns="0" bIns="0" rtlCol="0">
-            <a:spAutoFit/>
-          </a:bodyPr>
-          <a:lstStyle>
-            <a:defPPr>
-              <a:defRPr lang="en-US"/>
-            </a:defPPr>
-            <a:lvl1pPr algn="r">
-              <a:defRPr sz="1400">
-                <a:solidFill>
-                  <a:srgbClr val="0070C0"/>
-                </a:solidFill>
-              </a:defRPr>
-            </a:lvl1pPr>
-          </a:lstStyle>
-          <a:p>
-            <a:pPr algn="l"/>
-            <a:r>
-              <a:rPr lang="en-US" sz="1200" dirty="0">
-                <a:solidFill>
-                  <a:schemeClr val="accent6">
-                    <a:lumMod val="50000"/>
-                  </a:schemeClr>
-                </a:solidFill>
-              </a:rPr>
-              <a:t>[</a:t>
-            </a:r>
-            <a:r>
-              <a:rPr lang="en-US" sz="1200" dirty="0" err="1">
-                <a:solidFill>
-                  <a:schemeClr val="accent6">
-                    <a:lumMod val="50000"/>
-                  </a:schemeClr>
-                </a:solidFill>
-              </a:rPr>
-              <a:t>addressBookOptional.isPresent</a:t>
-            </a:r>
-            <a:r>
-              <a:rPr lang="en-US" sz="1200" dirty="0">
-                <a:solidFill>
-                  <a:schemeClr val="accent6">
-                    <a:lumMod val="50000"/>
-                  </a:schemeClr>
-                </a:solidFill>
-              </a:rPr>
-              <a:t>()]</a:t>
-            </a:r>
-          </a:p>
-        </p:txBody>
-      </p:sp>
-      <p:sp>
-        <p:nvSpPr>
-          <p:cNvPr id="29" name="Rectangle 28">
-            <a:extLst>
-              <a:ext uri="{FF2B5EF4-FFF2-40B4-BE49-F238E27FC236}">
-                <a16:creationId xmlns:a16="http://schemas.microsoft.com/office/drawing/2014/main" id="{B90D634A-8CE4-4225-9376-B7C9937D3AFF}"/>
-              </a:ext>
-            </a:extLst>
-          </p:cNvPr>
-          <p:cNvSpPr/>
-          <p:nvPr/>
-        </p:nvSpPr>
-        <p:spPr>
-          <a:xfrm>
-            <a:off x="2623859" y="3166752"/>
-            <a:ext cx="222832" cy="244919"/>
-          </a:xfrm>
-          <a:prstGeom prst="rect">
-            <a:avLst/>
-          </a:prstGeom>
-          <a:solidFill>
-            <a:srgbClr val="E46C0A"/>
-          </a:solidFill>
-          <a:ln>
-            <a:solidFill>
-              <a:schemeClr val="accent6">
-                <a:lumMod val="50000"/>
-              </a:schemeClr>
-            </a:solidFill>
-          </a:ln>
-          <a:effectLst/>
-        </p:spPr>
-        <p:style>
-          <a:lnRef idx="1">
-            <a:schemeClr val="accent3"/>
-          </a:lnRef>
-          <a:fillRef idx="2">
-            <a:schemeClr val="accent3"/>
-          </a:fillRef>
-          <a:effectRef idx="1">
-            <a:schemeClr val="accent3"/>
-          </a:effectRef>
-          <a:fontRef idx="minor">
-            <a:schemeClr val="dk1"/>
-          </a:fontRef>
-        </p:style>
-        <p:txBody>
-          <a:bodyPr rtlCol="0" anchor="ctr"/>
-          <a:lstStyle/>
-          <a:p>
-            <a:pPr algn="ctr"/>
-            <a:endParaRPr lang="en-SG" sz="1400" dirty="0">
-              <a:solidFill>
-                <a:schemeClr val="accent6">
-                  <a:lumMod val="75000"/>
-                </a:schemeClr>
-              </a:solidFill>
-            </a:endParaRPr>
-          </a:p>
-        </p:txBody>
-      </p:sp>
-      <p:cxnSp>
-        <p:nvCxnSpPr>
-          <p:cNvPr id="33" name="Straight Arrow Connector 117">
-            <a:extLst>
-              <a:ext uri="{FF2B5EF4-FFF2-40B4-BE49-F238E27FC236}">
-                <a16:creationId xmlns:a16="http://schemas.microsoft.com/office/drawing/2014/main" id="{9108A2D4-073B-415F-B9A2-E9A0987DBAD7}"/>
-              </a:ext>
-            </a:extLst>
-          </p:cNvPr>
-          <p:cNvCxnSpPr>
-            <a:cxnSpLocks/>
-          </p:cNvCxnSpPr>
-          <p:nvPr/>
-        </p:nvCxnSpPr>
-        <p:spPr>
-          <a:xfrm rot="10800000" flipV="1">
-            <a:off x="2696345" y="3352800"/>
-            <a:ext cx="156529" cy="149292"/>
-          </a:xfrm>
-          <a:prstGeom prst="curvedConnector3">
-            <a:avLst>
-              <a:gd name="adj1" fmla="val -86307"/>
-            </a:avLst>
-          </a:prstGeom>
-          <a:ln w="19050">
-            <a:solidFill>
-              <a:srgbClr val="E46C0A"/>
-            </a:solidFill>
-            <a:prstDash val="dash"/>
-            <a:tailEnd type="arrow"/>
           </a:ln>
         </p:spPr>
         <p:style>
@@ -5004,10 +4061,10 @@
       </p:cxnSp>
       <p:cxnSp>
         <p:nvCxnSpPr>
-          <p:cNvPr id="39" name="Straight Arrow Connector 117">
+          <p:cNvPr id="67" name="Straight Arrow Connector 66">
             <a:extLst>
               <a:ext uri="{FF2B5EF4-FFF2-40B4-BE49-F238E27FC236}">
-                <a16:creationId xmlns:a16="http://schemas.microsoft.com/office/drawing/2014/main" id="{DA558977-1D62-4098-824B-5BB0A887C39A}"/>
+                <a16:creationId xmlns:a16="http://schemas.microsoft.com/office/drawing/2014/main" id="{D881596E-177C-4FDC-8E60-CAB90B3D5FAB}"/>
               </a:ext>
             </a:extLst>
           </p:cNvPr>
@@ -5017,20 +4074,17 @@
           <p:nvPr/>
         </p:nvCxnSpPr>
         <p:spPr>
-          <a:xfrm rot="10800000" flipV="1">
-            <a:off x="2521880" y="3610505"/>
-            <a:ext cx="170923" cy="87458"/>
-          </a:xfrm>
-          <a:prstGeom prst="curvedConnector3">
-            <a:avLst>
-              <a:gd name="adj1" fmla="val -104320"/>
-            </a:avLst>
+          <a:xfrm>
+            <a:off x="3505246" y="1962905"/>
+            <a:ext cx="2284992" cy="0"/>
+          </a:xfrm>
+          <a:prstGeom prst="straightConnector1">
+            <a:avLst/>
           </a:prstGeom>
           <a:ln w="19050">
             <a:solidFill>
               <a:srgbClr val="E46C0A"/>
             </a:solidFill>
-            <a:prstDash val="dash"/>
             <a:tailEnd type="arrow"/>
           </a:ln>
         </p:spPr>
@@ -5049,12 +4103,73 @@
           </a:fontRef>
         </p:style>
       </p:cxnSp>
+      <p:sp>
+        <p:nvSpPr>
+          <p:cNvPr id="117" name="Rectangle 116">
+            <a:extLst>
+              <a:ext uri="{FF2B5EF4-FFF2-40B4-BE49-F238E27FC236}">
+                <a16:creationId xmlns:a16="http://schemas.microsoft.com/office/drawing/2014/main" id="{3B4C775E-3EA5-4DAB-8185-B313D1DE2DC6}"/>
+              </a:ext>
+            </a:extLst>
+          </p:cNvPr>
+          <p:cNvSpPr/>
+          <p:nvPr/>
+        </p:nvSpPr>
+        <p:spPr>
+          <a:xfrm>
+            <a:off x="3312508" y="1553799"/>
+            <a:ext cx="233779" cy="4551202"/>
+          </a:xfrm>
+          <a:prstGeom prst="rect">
+            <a:avLst/>
+          </a:prstGeom>
+          <a:solidFill>
+            <a:srgbClr val="E46C0A"/>
+          </a:solidFill>
+          <a:ln>
+            <a:solidFill>
+              <a:schemeClr val="accent6">
+                <a:lumMod val="50000"/>
+              </a:schemeClr>
+            </a:solidFill>
+          </a:ln>
+          <a:effectLst/>
+        </p:spPr>
+        <p:style>
+          <a:lnRef idx="1">
+            <a:schemeClr val="accent3"/>
+          </a:lnRef>
+          <a:fillRef idx="2">
+            <a:schemeClr val="accent3"/>
+          </a:fillRef>
+          <a:effectRef idx="1">
+            <a:schemeClr val="accent3"/>
+          </a:effectRef>
+          <a:fontRef idx="minor">
+            <a:schemeClr val="dk1"/>
+          </a:fontRef>
+        </p:style>
+        <p:txBody>
+          <a:bodyPr rtlCol="0" anchor="ctr"/>
+          <a:lstStyle/>
+          <a:p>
+            <a:pPr algn="ctr"/>
+            <a:endParaRPr lang="en-SG" sz="1400" dirty="0">
+              <a:solidFill>
+                <a:schemeClr val="accent6">
+                  <a:lumMod val="75000"/>
+                </a:schemeClr>
+              </a:solidFill>
+            </a:endParaRPr>
+          </a:p>
+        </p:txBody>
+      </p:sp>
       <p:cxnSp>
         <p:nvCxnSpPr>
-          <p:cNvPr id="43" name="Straight Arrow Connector 117">
+          <p:cNvPr id="118" name="Straight Arrow Connector 117">
             <a:extLst>
               <a:ext uri="{FF2B5EF4-FFF2-40B4-BE49-F238E27FC236}">
-                <a16:creationId xmlns:a16="http://schemas.microsoft.com/office/drawing/2014/main" id="{C85FC94E-30A8-4B2C-A4E2-87020F694200}"/>
+                <a16:creationId xmlns:a16="http://schemas.microsoft.com/office/drawing/2014/main" id="{E70CFE4D-9EAF-44B5-A8AC-B651291DD14E}"/>
               </a:ext>
             </a:extLst>
           </p:cNvPr>
@@ -5064,20 +4179,19 @@
           <p:nvPr/>
         </p:nvCxnSpPr>
         <p:spPr>
-          <a:xfrm rot="10800000" flipV="1">
-            <a:off x="2388048" y="3715807"/>
-            <a:ext cx="156529" cy="149292"/>
+          <a:xfrm>
+            <a:off x="3369819" y="1454452"/>
+            <a:ext cx="155953" cy="97385"/>
           </a:xfrm>
           <a:prstGeom prst="curvedConnector3">
             <a:avLst>
-              <a:gd name="adj1" fmla="val -86307"/>
+              <a:gd name="adj1" fmla="val 320615"/>
             </a:avLst>
           </a:prstGeom>
           <a:ln w="19050">
             <a:solidFill>
               <a:srgbClr val="E46C0A"/>
             </a:solidFill>
-            <a:prstDash val="dash"/>
             <a:tailEnd type="arrow"/>
           </a:ln>
         </p:spPr>
@@ -5098,10 +4212,118 @@
       </p:cxnSp>
       <p:sp>
         <p:nvSpPr>
-          <p:cNvPr id="44" name="TextBox 43">
+          <p:cNvPr id="147" name="Rectangle 146">
             <a:extLst>
               <a:ext uri="{FF2B5EF4-FFF2-40B4-BE49-F238E27FC236}">
-                <a16:creationId xmlns:a16="http://schemas.microsoft.com/office/drawing/2014/main" id="{E66BAC0F-2062-4403-A784-24E02F8F43DC}"/>
+                <a16:creationId xmlns:a16="http://schemas.microsoft.com/office/drawing/2014/main" id="{65FCBB28-2B62-4BB7-AAA4-49D65A53898A}"/>
+              </a:ext>
+            </a:extLst>
+          </p:cNvPr>
+          <p:cNvSpPr/>
+          <p:nvPr/>
+        </p:nvSpPr>
+        <p:spPr>
+          <a:xfrm>
+            <a:off x="2281032" y="1655144"/>
+            <a:ext cx="5719967" cy="4388483"/>
+          </a:xfrm>
+          <a:prstGeom prst="rect">
+            <a:avLst/>
+          </a:prstGeom>
+          <a:noFill/>
+          <a:ln>
+            <a:solidFill>
+              <a:schemeClr val="accent6">
+                <a:lumMod val="50000"/>
+              </a:schemeClr>
+            </a:solidFill>
+          </a:ln>
+        </p:spPr>
+        <p:style>
+          <a:lnRef idx="2">
+            <a:schemeClr val="accent1">
+              <a:shade val="50000"/>
+            </a:schemeClr>
+          </a:lnRef>
+          <a:fillRef idx="1">
+            <a:schemeClr val="accent1"/>
+          </a:fillRef>
+          <a:effectRef idx="0">
+            <a:schemeClr val="accent1"/>
+          </a:effectRef>
+          <a:fontRef idx="minor">
+            <a:schemeClr val="lt1"/>
+          </a:fontRef>
+        </p:style>
+        <p:txBody>
+          <a:bodyPr rtlCol="0" anchor="ctr"/>
+          <a:lstStyle/>
+          <a:p>
+            <a:pPr algn="ctr"/>
+            <a:endParaRPr lang="en-SG"/>
+          </a:p>
+        </p:txBody>
+      </p:sp>
+      <p:sp>
+        <p:nvSpPr>
+          <p:cNvPr id="148" name="Rectangle: Single Corner Snipped 147">
+            <a:extLst>
+              <a:ext uri="{FF2B5EF4-FFF2-40B4-BE49-F238E27FC236}">
+                <a16:creationId xmlns:a16="http://schemas.microsoft.com/office/drawing/2014/main" id="{C0B51C55-7A8B-45B8-8C02-18FC4A26E143}"/>
+              </a:ext>
+            </a:extLst>
+          </p:cNvPr>
+          <p:cNvSpPr/>
+          <p:nvPr/>
+        </p:nvSpPr>
+        <p:spPr>
+          <a:xfrm rot="10800000" flipH="1">
+            <a:off x="2293477" y="1651137"/>
+            <a:ext cx="457199" cy="275919"/>
+          </a:xfrm>
+          <a:prstGeom prst="snip1Rect">
+            <a:avLst/>
+          </a:prstGeom>
+          <a:noFill/>
+          <a:ln>
+            <a:solidFill>
+              <a:schemeClr val="accent6">
+                <a:lumMod val="50000"/>
+              </a:schemeClr>
+            </a:solidFill>
+          </a:ln>
+        </p:spPr>
+        <p:style>
+          <a:lnRef idx="2">
+            <a:schemeClr val="accent1">
+              <a:shade val="50000"/>
+            </a:schemeClr>
+          </a:lnRef>
+          <a:fillRef idx="1">
+            <a:schemeClr val="accent1"/>
+          </a:fillRef>
+          <a:effectRef idx="0">
+            <a:schemeClr val="accent1"/>
+          </a:effectRef>
+          <a:fontRef idx="minor">
+            <a:schemeClr val="lt1"/>
+          </a:fontRef>
+        </p:style>
+        <p:txBody>
+          <a:bodyPr rtlCol="0" anchor="ctr"/>
+          <a:lstStyle/>
+          <a:p>
+            <a:pPr algn="ctr"/>
+            <a:endParaRPr lang="en-SG" dirty="0"/>
+          </a:p>
+        </p:txBody>
+      </p:sp>
+      <p:sp>
+        <p:nvSpPr>
+          <p:cNvPr id="149" name="TextBox 148">
+            <a:extLst>
+              <a:ext uri="{FF2B5EF4-FFF2-40B4-BE49-F238E27FC236}">
+                <a16:creationId xmlns:a16="http://schemas.microsoft.com/office/drawing/2014/main" id="{4020EE11-0984-4CCD-91F3-C88BD9B027EC}"/>
               </a:ext>
             </a:extLst>
           </p:cNvPr>
@@ -5110,8 +4332,8 @@
         </p:nvSpPr>
         <p:spPr>
           <a:xfrm>
-            <a:off x="3214097" y="3056669"/>
-            <a:ext cx="3149788" cy="153888"/>
+            <a:off x="2404943" y="1679125"/>
+            <a:ext cx="336933" cy="215444"/>
           </a:xfrm>
           <a:prstGeom prst="rect">
             <a:avLst/>
@@ -5137,34 +4359,24 @@
           <a:p>
             <a:pPr algn="l"/>
             <a:r>
-              <a:rPr lang="en-US" sz="1000" dirty="0" err="1">
+              <a:rPr lang="en-US" dirty="0">
                 <a:solidFill>
                   <a:schemeClr val="accent6">
-                    <a:lumMod val="75000"/>
+                    <a:lumMod val="50000"/>
                   </a:schemeClr>
                 </a:solidFill>
               </a:rPr>
-              <a:t>getBackupStorageBookPath</a:t>
-            </a:r>
-            <a:r>
-              <a:rPr lang="en-US" sz="1000" dirty="0">
-                <a:solidFill>
-                  <a:schemeClr val="accent6">
-                    <a:lumMod val="75000"/>
-                  </a:schemeClr>
-                </a:solidFill>
-              </a:rPr>
-              <a:t>()</a:t>
+              <a:t>opt</a:t>
             </a:r>
           </a:p>
         </p:txBody>
       </p:sp>
       <p:cxnSp>
         <p:nvCxnSpPr>
-          <p:cNvPr id="46" name="Straight Arrow Connector 117">
+          <p:cNvPr id="39" name="Straight Arrow Connector 117">
             <a:extLst>
               <a:ext uri="{FF2B5EF4-FFF2-40B4-BE49-F238E27FC236}">
-                <a16:creationId xmlns:a16="http://schemas.microsoft.com/office/drawing/2014/main" id="{FDD5AF35-B189-4964-BB6A-F64E23107707}"/>
+                <a16:creationId xmlns:a16="http://schemas.microsoft.com/office/drawing/2014/main" id="{DA558977-1D62-4098-824B-5BB0A887C39A}"/>
               </a:ext>
             </a:extLst>
           </p:cNvPr>
@@ -5174,19 +4386,20 @@
           <p:nvPr/>
         </p:nvCxnSpPr>
         <p:spPr>
-          <a:xfrm>
-            <a:off x="2542389" y="2920303"/>
-            <a:ext cx="155953" cy="97385"/>
+          <a:xfrm rot="10800000" flipV="1">
+            <a:off x="3535870" y="5859034"/>
+            <a:ext cx="170923" cy="87458"/>
           </a:xfrm>
           <a:prstGeom prst="curvedConnector3">
             <a:avLst>
-              <a:gd name="adj1" fmla="val 320615"/>
+              <a:gd name="adj1" fmla="val -179405"/>
             </a:avLst>
           </a:prstGeom>
           <a:ln w="19050">
             <a:solidFill>
               <a:srgbClr val="E46C0A"/>
             </a:solidFill>
+            <a:prstDash val="dash"/>
             <a:tailEnd type="arrow"/>
           </a:ln>
         </p:spPr>
@@ -5205,12 +4418,65 @@
           </a:fontRef>
         </p:style>
       </p:cxnSp>
+      <p:sp>
+        <p:nvSpPr>
+          <p:cNvPr id="44" name="TextBox 43">
+            <a:extLst>
+              <a:ext uri="{FF2B5EF4-FFF2-40B4-BE49-F238E27FC236}">
+                <a16:creationId xmlns:a16="http://schemas.microsoft.com/office/drawing/2014/main" id="{E66BAC0F-2062-4403-A784-24E02F8F43DC}"/>
+              </a:ext>
+            </a:extLst>
+          </p:cNvPr>
+          <p:cNvSpPr txBox="1"/>
+          <p:nvPr/>
+        </p:nvSpPr>
+        <p:spPr>
+          <a:xfrm>
+            <a:off x="4102424" y="3950411"/>
+            <a:ext cx="2077181" cy="169277"/>
+          </a:xfrm>
+          <a:prstGeom prst="rect">
+            <a:avLst/>
+          </a:prstGeom>
+          <a:noFill/>
+        </p:spPr>
+        <p:txBody>
+          <a:bodyPr wrap="square" lIns="0" tIns="0" rIns="0" bIns="0" rtlCol="0">
+            <a:spAutoFit/>
+          </a:bodyPr>
+          <a:lstStyle>
+            <a:defPPr>
+              <a:defRPr lang="en-US"/>
+            </a:defPPr>
+            <a:lvl1pPr algn="r">
+              <a:defRPr sz="1400">
+                <a:solidFill>
+                  <a:srgbClr val="0070C0"/>
+                </a:solidFill>
+              </a:defRPr>
+            </a:lvl1pPr>
+          </a:lstStyle>
+          <a:p>
+            <a:pPr algn="l"/>
+            <a:r>
+              <a:rPr lang="en-US" sz="1100" dirty="0">
+                <a:solidFill>
+                  <a:schemeClr val="accent6">
+                    <a:lumMod val="75000"/>
+                  </a:schemeClr>
+                </a:solidFill>
+              </a:rPr>
+              <a:t>backup(addressBook:AddressBook)</a:t>
+            </a:r>
+          </a:p>
+        </p:txBody>
+      </p:sp>
       <p:cxnSp>
         <p:nvCxnSpPr>
-          <p:cNvPr id="47" name="Straight Arrow Connector 117">
+          <p:cNvPr id="46" name="Straight Arrow Connector 117">
             <a:extLst>
               <a:ext uri="{FF2B5EF4-FFF2-40B4-BE49-F238E27FC236}">
-                <a16:creationId xmlns:a16="http://schemas.microsoft.com/office/drawing/2014/main" id="{FEC7F042-F27D-49ED-A614-BD3C118E657E}"/>
+                <a16:creationId xmlns:a16="http://schemas.microsoft.com/office/drawing/2014/main" id="{FDD5AF35-B189-4964-BB6A-F64E23107707}"/>
               </a:ext>
             </a:extLst>
           </p:cNvPr>
@@ -5221,7 +4487,7 @@
         </p:nvCxnSpPr>
         <p:spPr>
           <a:xfrm>
-            <a:off x="2694789" y="3072703"/>
+            <a:off x="3555876" y="4073653"/>
             <a:ext cx="155953" cy="97385"/>
           </a:xfrm>
           <a:prstGeom prst="curvedConnector3">
@@ -5267,8 +4533,8 @@
         </p:nvCxnSpPr>
         <p:spPr>
           <a:xfrm flipH="1">
-            <a:off x="1143000" y="4495800"/>
-            <a:ext cx="1136536" cy="0"/>
+            <a:off x="1439694" y="6313322"/>
+            <a:ext cx="1718964" cy="0"/>
           </a:xfrm>
           <a:prstGeom prst="straightConnector1">
             <a:avLst/>
@@ -5295,6 +4561,1312 @@
           </a:fontRef>
         </p:style>
       </p:cxnSp>
+      <p:sp>
+        <p:nvSpPr>
+          <p:cNvPr id="37" name="TextBox 36">
+            <a:extLst>
+              <a:ext uri="{FF2B5EF4-FFF2-40B4-BE49-F238E27FC236}">
+                <a16:creationId xmlns:a16="http://schemas.microsoft.com/office/drawing/2014/main" id="{F0AA93D5-1B7C-4874-B051-FF5DCD4C9DA1}"/>
+              </a:ext>
+            </a:extLst>
+          </p:cNvPr>
+          <p:cNvSpPr txBox="1"/>
+          <p:nvPr/>
+        </p:nvSpPr>
+        <p:spPr>
+          <a:xfrm>
+            <a:off x="3474774" y="1277904"/>
+            <a:ext cx="1950565" cy="169277"/>
+          </a:xfrm>
+          <a:prstGeom prst="rect">
+            <a:avLst/>
+          </a:prstGeom>
+          <a:noFill/>
+        </p:spPr>
+        <p:txBody>
+          <a:bodyPr wrap="square" lIns="0" tIns="0" rIns="0" bIns="0" rtlCol="0">
+            <a:spAutoFit/>
+          </a:bodyPr>
+          <a:lstStyle/>
+          <a:p>
+            <a:pPr algn="r"/>
+            <a:r>
+              <a:rPr lang="en-US" sz="1100" dirty="0">
+                <a:solidFill>
+                  <a:schemeClr val="accent6">
+                    <a:lumMod val="75000"/>
+                  </a:schemeClr>
+                </a:solidFill>
+              </a:rPr>
+              <a:t>backup(</a:t>
+            </a:r>
+            <a:r>
+              <a:rPr lang="en-US" sz="1100" dirty="0" err="1">
+                <a:solidFill>
+                  <a:schemeClr val="accent6">
+                    <a:lumMod val="75000"/>
+                  </a:schemeClr>
+                </a:solidFill>
+              </a:rPr>
+              <a:t>addressBookStorage</a:t>
+            </a:r>
+            <a:r>
+              <a:rPr lang="en-US" sz="1100" dirty="0">
+                <a:solidFill>
+                  <a:schemeClr val="accent6">
+                    <a:lumMod val="75000"/>
+                  </a:schemeClr>
+                </a:solidFill>
+              </a:rPr>
+              <a:t>)</a:t>
+            </a:r>
+          </a:p>
+        </p:txBody>
+      </p:sp>
+      <p:sp>
+        <p:nvSpPr>
+          <p:cNvPr id="16" name="Rectangle 62"/>
+          <p:cNvSpPr/>
+          <p:nvPr/>
+        </p:nvSpPr>
+        <p:spPr>
+          <a:xfrm>
+            <a:off x="4422915" y="748404"/>
+            <a:ext cx="3054348" cy="294306"/>
+          </a:xfrm>
+          <a:prstGeom prst="rect">
+            <a:avLst/>
+          </a:prstGeom>
+          <a:solidFill>
+            <a:srgbClr val="E46C0A"/>
+          </a:solidFill>
+          <a:ln w="19050">
+            <a:solidFill>
+              <a:srgbClr val="E46C0A"/>
+            </a:solidFill>
+          </a:ln>
+          <a:effectLst/>
+        </p:spPr>
+        <p:style>
+          <a:lnRef idx="1">
+            <a:schemeClr val="accent2"/>
+          </a:lnRef>
+          <a:fillRef idx="2">
+            <a:schemeClr val="accent2"/>
+          </a:fillRef>
+          <a:effectRef idx="1">
+            <a:schemeClr val="accent2"/>
+          </a:effectRef>
+          <a:fontRef idx="minor">
+            <a:schemeClr val="dk1"/>
+          </a:fontRef>
+        </p:style>
+        <p:txBody>
+          <a:bodyPr rtlCol="0" anchor="ctr"/>
+          <a:lstStyle/>
+          <a:p>
+            <a:pPr algn="ctr"/>
+            <a:r>
+              <a:rPr lang="en-US" sz="1200" dirty="0">
+                <a:solidFill>
+                  <a:schemeClr val="bg1"/>
+                </a:solidFill>
+              </a:rPr>
+              <a:t>addressBookStorage:AddressBookStorage</a:t>
+            </a:r>
+            <a:endParaRPr lang="en-SG" sz="1200" dirty="0">
+              <a:solidFill>
+                <a:schemeClr val="bg1"/>
+              </a:solidFill>
+            </a:endParaRPr>
+          </a:p>
+        </p:txBody>
+      </p:sp>
+      <p:sp>
+        <p:nvSpPr>
+          <p:cNvPr id="41" name="TextBox 40">
+            <a:extLst>
+              <a:ext uri="{FF2B5EF4-FFF2-40B4-BE49-F238E27FC236}">
+                <a16:creationId xmlns:a16="http://schemas.microsoft.com/office/drawing/2014/main" id="{38D480A2-66F2-4B83-8B13-0FFAE6DBC05C}"/>
+              </a:ext>
+            </a:extLst>
+          </p:cNvPr>
+          <p:cNvSpPr txBox="1"/>
+          <p:nvPr/>
+        </p:nvSpPr>
+        <p:spPr>
+          <a:xfrm>
+            <a:off x="4017348" y="1767077"/>
+            <a:ext cx="1330819" cy="169277"/>
+          </a:xfrm>
+          <a:prstGeom prst="rect">
+            <a:avLst/>
+          </a:prstGeom>
+          <a:noFill/>
+        </p:spPr>
+        <p:txBody>
+          <a:bodyPr wrap="square" lIns="0" tIns="0" rIns="0" bIns="0" rtlCol="0">
+            <a:spAutoFit/>
+          </a:bodyPr>
+          <a:lstStyle/>
+          <a:p>
+            <a:pPr algn="r"/>
+            <a:r>
+              <a:rPr lang="en-US" sz="1100" dirty="0" err="1">
+                <a:solidFill>
+                  <a:schemeClr val="accent6">
+                    <a:lumMod val="75000"/>
+                  </a:schemeClr>
+                </a:solidFill>
+              </a:rPr>
+              <a:t>readAddressBook</a:t>
+            </a:r>
+            <a:r>
+              <a:rPr lang="en-US" sz="1100" dirty="0">
+                <a:solidFill>
+                  <a:schemeClr val="accent6">
+                    <a:lumMod val="75000"/>
+                  </a:schemeClr>
+                </a:solidFill>
+              </a:rPr>
+              <a:t>()</a:t>
+            </a:r>
+          </a:p>
+        </p:txBody>
+      </p:sp>
+      <p:sp>
+        <p:nvSpPr>
+          <p:cNvPr id="60" name="TextBox 59">
+            <a:extLst>
+              <a:ext uri="{FF2B5EF4-FFF2-40B4-BE49-F238E27FC236}">
+                <a16:creationId xmlns:a16="http://schemas.microsoft.com/office/drawing/2014/main" id="{2514D844-7B02-45A4-B630-873FFAAB3D5C}"/>
+              </a:ext>
+            </a:extLst>
+          </p:cNvPr>
+          <p:cNvSpPr txBox="1"/>
+          <p:nvPr/>
+        </p:nvSpPr>
+        <p:spPr>
+          <a:xfrm>
+            <a:off x="3593746" y="2640267"/>
+            <a:ext cx="1767758" cy="169277"/>
+          </a:xfrm>
+          <a:prstGeom prst="rect">
+            <a:avLst/>
+          </a:prstGeom>
+          <a:noFill/>
+        </p:spPr>
+        <p:txBody>
+          <a:bodyPr wrap="square" lIns="0" tIns="0" rIns="0" bIns="0" rtlCol="0">
+            <a:spAutoFit/>
+          </a:bodyPr>
+          <a:lstStyle/>
+          <a:p>
+            <a:pPr algn="r"/>
+            <a:r>
+              <a:rPr lang="en-US" sz="1100" dirty="0">
+                <a:solidFill>
+                  <a:schemeClr val="accent6">
+                    <a:lumMod val="75000"/>
+                  </a:schemeClr>
+                </a:solidFill>
+              </a:rPr>
+              <a:t>addressBookOptional</a:t>
+            </a:r>
+          </a:p>
+        </p:txBody>
+      </p:sp>
+      <p:sp>
+        <p:nvSpPr>
+          <p:cNvPr id="65" name="Rectangle 64">
+            <a:extLst>
+              <a:ext uri="{FF2B5EF4-FFF2-40B4-BE49-F238E27FC236}">
+                <a16:creationId xmlns:a16="http://schemas.microsoft.com/office/drawing/2014/main" id="{CF9B4B92-0053-4250-B3FB-B398FE1D4364}"/>
+              </a:ext>
+            </a:extLst>
+          </p:cNvPr>
+          <p:cNvSpPr/>
+          <p:nvPr/>
+        </p:nvSpPr>
+        <p:spPr>
+          <a:xfrm>
+            <a:off x="3464073" y="4173042"/>
+            <a:ext cx="233779" cy="1678874"/>
+          </a:xfrm>
+          <a:prstGeom prst="rect">
+            <a:avLst/>
+          </a:prstGeom>
+          <a:solidFill>
+            <a:srgbClr val="E46C0A"/>
+          </a:solidFill>
+          <a:ln>
+            <a:solidFill>
+              <a:schemeClr val="accent6">
+                <a:lumMod val="50000"/>
+              </a:schemeClr>
+            </a:solidFill>
+          </a:ln>
+          <a:effectLst/>
+        </p:spPr>
+        <p:style>
+          <a:lnRef idx="1">
+            <a:schemeClr val="accent3"/>
+          </a:lnRef>
+          <a:fillRef idx="2">
+            <a:schemeClr val="accent3"/>
+          </a:fillRef>
+          <a:effectRef idx="1">
+            <a:schemeClr val="accent3"/>
+          </a:effectRef>
+          <a:fontRef idx="minor">
+            <a:schemeClr val="dk1"/>
+          </a:fontRef>
+        </p:style>
+        <p:txBody>
+          <a:bodyPr rtlCol="0" anchor="ctr"/>
+          <a:lstStyle/>
+          <a:p>
+            <a:pPr algn="ctr"/>
+            <a:endParaRPr lang="en-SG" sz="1400" dirty="0">
+              <a:solidFill>
+                <a:schemeClr val="accent6">
+                  <a:lumMod val="75000"/>
+                </a:schemeClr>
+              </a:solidFill>
+            </a:endParaRPr>
+          </a:p>
+        </p:txBody>
+      </p:sp>
+      <p:cxnSp>
+        <p:nvCxnSpPr>
+          <p:cNvPr id="69" name="Straight Connector 68">
+            <a:extLst>
+              <a:ext uri="{FF2B5EF4-FFF2-40B4-BE49-F238E27FC236}">
+                <a16:creationId xmlns:a16="http://schemas.microsoft.com/office/drawing/2014/main" id="{D7EBF7DC-EA2E-4951-BF00-EA033DB34EE9}"/>
+              </a:ext>
+            </a:extLst>
+          </p:cNvPr>
+          <p:cNvCxnSpPr>
+            <a:cxnSpLocks/>
+          </p:cNvCxnSpPr>
+          <p:nvPr/>
+        </p:nvCxnSpPr>
+        <p:spPr>
+          <a:xfrm>
+            <a:off x="7086600" y="1269730"/>
+            <a:ext cx="0" cy="2680681"/>
+          </a:xfrm>
+          <a:prstGeom prst="line">
+            <a:avLst/>
+          </a:prstGeom>
+          <a:ln w="19050">
+            <a:solidFill>
+              <a:srgbClr val="E46C0A"/>
+            </a:solidFill>
+            <a:prstDash val="sysDash"/>
+          </a:ln>
+          <a:effectLst/>
+        </p:spPr>
+        <p:style>
+          <a:lnRef idx="1">
+            <a:schemeClr val="accent1"/>
+          </a:lnRef>
+          <a:fillRef idx="2">
+            <a:schemeClr val="accent1"/>
+          </a:fillRef>
+          <a:effectRef idx="1">
+            <a:schemeClr val="accent1"/>
+          </a:effectRef>
+          <a:fontRef idx="minor">
+            <a:schemeClr val="dk1"/>
+          </a:fontRef>
+        </p:style>
+      </p:cxnSp>
+      <p:sp>
+        <p:nvSpPr>
+          <p:cNvPr id="70" name="Rectangle 62">
+            <a:extLst>
+              <a:ext uri="{FF2B5EF4-FFF2-40B4-BE49-F238E27FC236}">
+                <a16:creationId xmlns:a16="http://schemas.microsoft.com/office/drawing/2014/main" id="{4E5C4DD7-D9BB-49E5-854E-4EBE30CB6081}"/>
+              </a:ext>
+            </a:extLst>
+          </p:cNvPr>
+          <p:cNvSpPr/>
+          <p:nvPr/>
+        </p:nvSpPr>
+        <p:spPr>
+          <a:xfrm>
+            <a:off x="6117023" y="1128460"/>
+            <a:ext cx="1940523" cy="410156"/>
+          </a:xfrm>
+          <a:prstGeom prst="rect">
+            <a:avLst/>
+          </a:prstGeom>
+          <a:solidFill>
+            <a:srgbClr val="E46C0A"/>
+          </a:solidFill>
+          <a:ln w="19050">
+            <a:solidFill>
+              <a:srgbClr val="E46C0A"/>
+            </a:solidFill>
+          </a:ln>
+          <a:effectLst/>
+        </p:spPr>
+        <p:style>
+          <a:lnRef idx="1">
+            <a:schemeClr val="accent2"/>
+          </a:lnRef>
+          <a:fillRef idx="2">
+            <a:schemeClr val="accent2"/>
+          </a:fillRef>
+          <a:effectRef idx="1">
+            <a:schemeClr val="accent2"/>
+          </a:effectRef>
+          <a:fontRef idx="minor">
+            <a:schemeClr val="dk1"/>
+          </a:fontRef>
+        </p:style>
+        <p:txBody>
+          <a:bodyPr rtlCol="0" anchor="ctr"/>
+          <a:lstStyle/>
+          <a:p>
+            <a:pPr algn="ctr"/>
+            <a:r>
+              <a:rPr lang="en-US" sz="1200" dirty="0">
+                <a:solidFill>
+                  <a:schemeClr val="bg1"/>
+                </a:solidFill>
+              </a:rPr>
+              <a:t>addressBookOptional</a:t>
+            </a:r>
+            <a:br>
+              <a:rPr lang="en-US" sz="1200" dirty="0">
+                <a:solidFill>
+                  <a:schemeClr val="bg1"/>
+                </a:solidFill>
+              </a:rPr>
+            </a:br>
+            <a:r>
+              <a:rPr lang="en-US" sz="1200" dirty="0">
+                <a:solidFill>
+                  <a:schemeClr val="bg1"/>
+                </a:solidFill>
+              </a:rPr>
+              <a:t>:Optional&lt;</a:t>
+            </a:r>
+            <a:r>
+              <a:rPr lang="en-US" sz="1200" dirty="0" err="1">
+                <a:solidFill>
+                  <a:schemeClr val="bg1"/>
+                </a:solidFill>
+              </a:rPr>
+              <a:t>AddressBook</a:t>
+            </a:r>
+            <a:r>
+              <a:rPr lang="en-US" sz="1200" dirty="0">
+                <a:solidFill>
+                  <a:schemeClr val="bg1"/>
+                </a:solidFill>
+              </a:rPr>
+              <a:t>&gt;</a:t>
+            </a:r>
+            <a:endParaRPr lang="en-SG" sz="1200" dirty="0">
+              <a:solidFill>
+                <a:schemeClr val="bg1"/>
+              </a:solidFill>
+            </a:endParaRPr>
+          </a:p>
+        </p:txBody>
+      </p:sp>
+      <p:sp>
+        <p:nvSpPr>
+          <p:cNvPr id="72" name="Rectangle 71">
+            <a:extLst>
+              <a:ext uri="{FF2B5EF4-FFF2-40B4-BE49-F238E27FC236}">
+                <a16:creationId xmlns:a16="http://schemas.microsoft.com/office/drawing/2014/main" id="{F01F9A16-D069-40AF-B26B-6B70096214D0}"/>
+              </a:ext>
+            </a:extLst>
+          </p:cNvPr>
+          <p:cNvSpPr/>
+          <p:nvPr/>
+        </p:nvSpPr>
+        <p:spPr>
+          <a:xfrm>
+            <a:off x="6976839" y="3198617"/>
+            <a:ext cx="222832" cy="541587"/>
+          </a:xfrm>
+          <a:prstGeom prst="rect">
+            <a:avLst/>
+          </a:prstGeom>
+          <a:solidFill>
+            <a:srgbClr val="E46C0A"/>
+          </a:solidFill>
+          <a:ln>
+            <a:solidFill>
+              <a:srgbClr val="E46C0A"/>
+            </a:solidFill>
+          </a:ln>
+          <a:effectLst/>
+        </p:spPr>
+        <p:style>
+          <a:lnRef idx="1">
+            <a:schemeClr val="accent3"/>
+          </a:lnRef>
+          <a:fillRef idx="2">
+            <a:schemeClr val="accent3"/>
+          </a:fillRef>
+          <a:effectRef idx="1">
+            <a:schemeClr val="accent3"/>
+          </a:effectRef>
+          <a:fontRef idx="minor">
+            <a:schemeClr val="dk1"/>
+          </a:fontRef>
+        </p:style>
+        <p:txBody>
+          <a:bodyPr rtlCol="0" anchor="ctr"/>
+          <a:lstStyle/>
+          <a:p>
+            <a:pPr algn="ctr"/>
+            <a:endParaRPr lang="en-SG" sz="1400">
+              <a:solidFill>
+                <a:schemeClr val="dk1"/>
+              </a:solidFill>
+            </a:endParaRPr>
+          </a:p>
+        </p:txBody>
+      </p:sp>
+      <p:cxnSp>
+        <p:nvCxnSpPr>
+          <p:cNvPr id="73" name="Straight Arrow Connector 72">
+            <a:extLst>
+              <a:ext uri="{FF2B5EF4-FFF2-40B4-BE49-F238E27FC236}">
+                <a16:creationId xmlns:a16="http://schemas.microsoft.com/office/drawing/2014/main" id="{49A6C314-2F91-4C23-9B70-08536F961D28}"/>
+              </a:ext>
+            </a:extLst>
+          </p:cNvPr>
+          <p:cNvCxnSpPr>
+            <a:cxnSpLocks/>
+            <a:endCxn id="72" idx="2"/>
+          </p:cNvCxnSpPr>
+          <p:nvPr/>
+        </p:nvCxnSpPr>
+        <p:spPr>
+          <a:xfrm>
+            <a:off x="3552873" y="3731597"/>
+            <a:ext cx="3535382" cy="8607"/>
+          </a:xfrm>
+          <a:prstGeom prst="straightConnector1">
+            <a:avLst/>
+          </a:prstGeom>
+          <a:ln w="19050">
+            <a:solidFill>
+              <a:srgbClr val="E46C0A"/>
+            </a:solidFill>
+            <a:prstDash val="sysDash"/>
+            <a:headEnd type="arrow" w="med" len="med"/>
+            <a:tailEnd type="none" w="med" len="med"/>
+          </a:ln>
+        </p:spPr>
+        <p:style>
+          <a:lnRef idx="1">
+            <a:schemeClr val="accent1"/>
+          </a:lnRef>
+          <a:fillRef idx="0">
+            <a:schemeClr val="accent1"/>
+          </a:fillRef>
+          <a:effectRef idx="0">
+            <a:schemeClr val="accent1"/>
+          </a:effectRef>
+          <a:fontRef idx="minor">
+            <a:schemeClr val="tx1"/>
+          </a:fontRef>
+        </p:style>
+      </p:cxnSp>
+      <p:cxnSp>
+        <p:nvCxnSpPr>
+          <p:cNvPr id="74" name="Straight Arrow Connector 73">
+            <a:extLst>
+              <a:ext uri="{FF2B5EF4-FFF2-40B4-BE49-F238E27FC236}">
+                <a16:creationId xmlns:a16="http://schemas.microsoft.com/office/drawing/2014/main" id="{2087A906-B1EE-48AF-A851-10AEB4FB4BFC}"/>
+              </a:ext>
+            </a:extLst>
+          </p:cNvPr>
+          <p:cNvCxnSpPr>
+            <a:cxnSpLocks/>
+          </p:cNvCxnSpPr>
+          <p:nvPr/>
+        </p:nvCxnSpPr>
+        <p:spPr>
+          <a:xfrm>
+            <a:off x="3574708" y="3200400"/>
+            <a:ext cx="3402131" cy="0"/>
+          </a:xfrm>
+          <a:prstGeom prst="straightConnector1">
+            <a:avLst/>
+          </a:prstGeom>
+          <a:ln w="19050">
+            <a:solidFill>
+              <a:srgbClr val="E46C0A"/>
+            </a:solidFill>
+            <a:tailEnd type="arrow"/>
+          </a:ln>
+        </p:spPr>
+        <p:style>
+          <a:lnRef idx="1">
+            <a:schemeClr val="accent1"/>
+          </a:lnRef>
+          <a:fillRef idx="0">
+            <a:schemeClr val="accent1"/>
+          </a:fillRef>
+          <a:effectRef idx="0">
+            <a:schemeClr val="accent1"/>
+          </a:effectRef>
+          <a:fontRef idx="minor">
+            <a:schemeClr val="tx1"/>
+          </a:fontRef>
+        </p:style>
+      </p:cxnSp>
+      <p:sp>
+        <p:nvSpPr>
+          <p:cNvPr id="48" name="TextBox 47">
+            <a:extLst>
+              <a:ext uri="{FF2B5EF4-FFF2-40B4-BE49-F238E27FC236}">
+                <a16:creationId xmlns:a16="http://schemas.microsoft.com/office/drawing/2014/main" id="{CA389AB9-D1AA-4689-9A88-046E04E8F992}"/>
+              </a:ext>
+            </a:extLst>
+          </p:cNvPr>
+          <p:cNvSpPr txBox="1"/>
+          <p:nvPr/>
+        </p:nvSpPr>
+        <p:spPr>
+          <a:xfrm>
+            <a:off x="5113687" y="3007929"/>
+            <a:ext cx="373032" cy="169277"/>
+          </a:xfrm>
+          <a:prstGeom prst="rect">
+            <a:avLst/>
+          </a:prstGeom>
+          <a:noFill/>
+        </p:spPr>
+        <p:txBody>
+          <a:bodyPr wrap="square" lIns="0" tIns="0" rIns="0" bIns="0" rtlCol="0">
+            <a:spAutoFit/>
+          </a:bodyPr>
+          <a:lstStyle/>
+          <a:p>
+            <a:pPr algn="r"/>
+            <a:r>
+              <a:rPr lang="en-US" sz="1100" dirty="0">
+                <a:solidFill>
+                  <a:schemeClr val="accent6">
+                    <a:lumMod val="75000"/>
+                  </a:schemeClr>
+                </a:solidFill>
+              </a:rPr>
+              <a:t>get()</a:t>
+            </a:r>
+          </a:p>
+        </p:txBody>
+      </p:sp>
+      <p:sp>
+        <p:nvSpPr>
+          <p:cNvPr id="49" name="TextBox 48">
+            <a:extLst>
+              <a:ext uri="{FF2B5EF4-FFF2-40B4-BE49-F238E27FC236}">
+                <a16:creationId xmlns:a16="http://schemas.microsoft.com/office/drawing/2014/main" id="{2D892997-2536-419B-9B86-2DDA9C17ADCA}"/>
+              </a:ext>
+            </a:extLst>
+          </p:cNvPr>
+          <p:cNvSpPr txBox="1"/>
+          <p:nvPr/>
+        </p:nvSpPr>
+        <p:spPr>
+          <a:xfrm>
+            <a:off x="4024389" y="3552846"/>
+            <a:ext cx="1767758" cy="169277"/>
+          </a:xfrm>
+          <a:prstGeom prst="rect">
+            <a:avLst/>
+          </a:prstGeom>
+          <a:noFill/>
+        </p:spPr>
+        <p:txBody>
+          <a:bodyPr wrap="square" lIns="0" tIns="0" rIns="0" bIns="0" rtlCol="0">
+            <a:spAutoFit/>
+          </a:bodyPr>
+          <a:lstStyle/>
+          <a:p>
+            <a:pPr algn="r"/>
+            <a:r>
+              <a:rPr lang="en-US" sz="1100" dirty="0" err="1">
+                <a:solidFill>
+                  <a:schemeClr val="accent6">
+                    <a:lumMod val="75000"/>
+                  </a:schemeClr>
+                </a:solidFill>
+              </a:rPr>
+              <a:t>addressBook</a:t>
+            </a:r>
+            <a:endParaRPr lang="en-US" sz="1100" dirty="0">
+              <a:solidFill>
+                <a:schemeClr val="accent6">
+                  <a:lumMod val="75000"/>
+                </a:schemeClr>
+              </a:solidFill>
+            </a:endParaRPr>
+          </a:p>
+        </p:txBody>
+      </p:sp>
+      <p:sp>
+        <p:nvSpPr>
+          <p:cNvPr id="59" name="Rectangle 58">
+            <a:extLst>
+              <a:ext uri="{FF2B5EF4-FFF2-40B4-BE49-F238E27FC236}">
+                <a16:creationId xmlns:a16="http://schemas.microsoft.com/office/drawing/2014/main" id="{16206CFA-C851-4131-8EB7-C072A537EB2F}"/>
+              </a:ext>
+            </a:extLst>
+          </p:cNvPr>
+          <p:cNvSpPr/>
+          <p:nvPr/>
+        </p:nvSpPr>
+        <p:spPr>
+          <a:xfrm>
+            <a:off x="3624579" y="4352639"/>
+            <a:ext cx="233779" cy="315022"/>
+          </a:xfrm>
+          <a:prstGeom prst="rect">
+            <a:avLst/>
+          </a:prstGeom>
+          <a:solidFill>
+            <a:srgbClr val="E46C0A"/>
+          </a:solidFill>
+          <a:ln>
+            <a:solidFill>
+              <a:schemeClr val="accent6">
+                <a:lumMod val="50000"/>
+              </a:schemeClr>
+            </a:solidFill>
+          </a:ln>
+          <a:effectLst/>
+        </p:spPr>
+        <p:style>
+          <a:lnRef idx="1">
+            <a:schemeClr val="accent3"/>
+          </a:lnRef>
+          <a:fillRef idx="2">
+            <a:schemeClr val="accent3"/>
+          </a:fillRef>
+          <a:effectRef idx="1">
+            <a:schemeClr val="accent3"/>
+          </a:effectRef>
+          <a:fontRef idx="minor">
+            <a:schemeClr val="dk1"/>
+          </a:fontRef>
+        </p:style>
+        <p:txBody>
+          <a:bodyPr rtlCol="0" anchor="ctr"/>
+          <a:lstStyle/>
+          <a:p>
+            <a:pPr algn="ctr"/>
+            <a:endParaRPr lang="en-SG" sz="1400" dirty="0">
+              <a:solidFill>
+                <a:schemeClr val="accent6">
+                  <a:lumMod val="75000"/>
+                </a:schemeClr>
+              </a:solidFill>
+            </a:endParaRPr>
+          </a:p>
+        </p:txBody>
+      </p:sp>
+      <p:cxnSp>
+        <p:nvCxnSpPr>
+          <p:cNvPr id="61" name="Straight Arrow Connector 117">
+            <a:extLst>
+              <a:ext uri="{FF2B5EF4-FFF2-40B4-BE49-F238E27FC236}">
+                <a16:creationId xmlns:a16="http://schemas.microsoft.com/office/drawing/2014/main" id="{FA60CAD8-616C-4BBA-A8CD-8E6C1EC8AC20}"/>
+              </a:ext>
+            </a:extLst>
+          </p:cNvPr>
+          <p:cNvCxnSpPr>
+            <a:cxnSpLocks/>
+          </p:cNvCxnSpPr>
+          <p:nvPr/>
+        </p:nvCxnSpPr>
+        <p:spPr>
+          <a:xfrm rot="10800000" flipV="1">
+            <a:off x="3706065" y="4674779"/>
+            <a:ext cx="170923" cy="87458"/>
+          </a:xfrm>
+          <a:prstGeom prst="curvedConnector3">
+            <a:avLst>
+              <a:gd name="adj1" fmla="val -179405"/>
+            </a:avLst>
+          </a:prstGeom>
+          <a:ln w="19050">
+            <a:solidFill>
+              <a:srgbClr val="E46C0A"/>
+            </a:solidFill>
+            <a:prstDash val="dash"/>
+            <a:tailEnd type="arrow"/>
+          </a:ln>
+        </p:spPr>
+        <p:style>
+          <a:lnRef idx="1">
+            <a:schemeClr val="accent1"/>
+          </a:lnRef>
+          <a:fillRef idx="0">
+            <a:schemeClr val="accent1"/>
+          </a:fillRef>
+          <a:effectRef idx="0">
+            <a:schemeClr val="accent1"/>
+          </a:effectRef>
+          <a:fontRef idx="minor">
+            <a:schemeClr val="tx1"/>
+          </a:fontRef>
+        </p:style>
+      </p:cxnSp>
+      <p:cxnSp>
+        <p:nvCxnSpPr>
+          <p:cNvPr id="62" name="Straight Arrow Connector 117">
+            <a:extLst>
+              <a:ext uri="{FF2B5EF4-FFF2-40B4-BE49-F238E27FC236}">
+                <a16:creationId xmlns:a16="http://schemas.microsoft.com/office/drawing/2014/main" id="{964E86F5-9718-4CCB-A57A-D35767EFC7C8}"/>
+              </a:ext>
+            </a:extLst>
+          </p:cNvPr>
+          <p:cNvCxnSpPr>
+            <a:cxnSpLocks/>
+          </p:cNvCxnSpPr>
+          <p:nvPr/>
+        </p:nvCxnSpPr>
+        <p:spPr>
+          <a:xfrm rot="10800000" flipV="1">
+            <a:off x="3383317" y="6112926"/>
+            <a:ext cx="170923" cy="87458"/>
+          </a:xfrm>
+          <a:prstGeom prst="curvedConnector3">
+            <a:avLst>
+              <a:gd name="adj1" fmla="val -179405"/>
+            </a:avLst>
+          </a:prstGeom>
+          <a:ln w="19050">
+            <a:solidFill>
+              <a:srgbClr val="E46C0A"/>
+            </a:solidFill>
+            <a:prstDash val="dash"/>
+            <a:tailEnd type="arrow"/>
+          </a:ln>
+        </p:spPr>
+        <p:style>
+          <a:lnRef idx="1">
+            <a:schemeClr val="accent1"/>
+          </a:lnRef>
+          <a:fillRef idx="0">
+            <a:schemeClr val="accent1"/>
+          </a:fillRef>
+          <a:effectRef idx="0">
+            <a:schemeClr val="accent1"/>
+          </a:effectRef>
+          <a:fontRef idx="minor">
+            <a:schemeClr val="tx1"/>
+          </a:fontRef>
+        </p:style>
+      </p:cxnSp>
+      <p:cxnSp>
+        <p:nvCxnSpPr>
+          <p:cNvPr id="63" name="Straight Arrow Connector 117">
+            <a:extLst>
+              <a:ext uri="{FF2B5EF4-FFF2-40B4-BE49-F238E27FC236}">
+                <a16:creationId xmlns:a16="http://schemas.microsoft.com/office/drawing/2014/main" id="{8E07067B-DF74-410A-A756-11A0ECFBC2DE}"/>
+              </a:ext>
+            </a:extLst>
+          </p:cNvPr>
+          <p:cNvCxnSpPr>
+            <a:cxnSpLocks/>
+          </p:cNvCxnSpPr>
+          <p:nvPr/>
+        </p:nvCxnSpPr>
+        <p:spPr>
+          <a:xfrm>
+            <a:off x="3700226" y="4278694"/>
+            <a:ext cx="155953" cy="97385"/>
+          </a:xfrm>
+          <a:prstGeom prst="curvedConnector3">
+            <a:avLst>
+              <a:gd name="adj1" fmla="val 320615"/>
+            </a:avLst>
+          </a:prstGeom>
+          <a:ln w="19050">
+            <a:solidFill>
+              <a:srgbClr val="E46C0A"/>
+            </a:solidFill>
+            <a:tailEnd type="arrow"/>
+          </a:ln>
+        </p:spPr>
+        <p:style>
+          <a:lnRef idx="1">
+            <a:schemeClr val="accent1"/>
+          </a:lnRef>
+          <a:fillRef idx="0">
+            <a:schemeClr val="accent1"/>
+          </a:fillRef>
+          <a:effectRef idx="0">
+            <a:schemeClr val="accent1"/>
+          </a:effectRef>
+          <a:fontRef idx="minor">
+            <a:schemeClr val="tx1"/>
+          </a:fontRef>
+        </p:style>
+      </p:cxnSp>
+      <p:sp>
+        <p:nvSpPr>
+          <p:cNvPr id="64" name="TextBox 63">
+            <a:extLst>
+              <a:ext uri="{FF2B5EF4-FFF2-40B4-BE49-F238E27FC236}">
+                <a16:creationId xmlns:a16="http://schemas.microsoft.com/office/drawing/2014/main" id="{262F6679-02C4-435B-B195-D82F63C6C709}"/>
+              </a:ext>
+            </a:extLst>
+          </p:cNvPr>
+          <p:cNvSpPr txBox="1"/>
+          <p:nvPr/>
+        </p:nvSpPr>
+        <p:spPr>
+          <a:xfrm>
+            <a:off x="4256936" y="4221035"/>
+            <a:ext cx="1756121" cy="169277"/>
+          </a:xfrm>
+          <a:prstGeom prst="rect">
+            <a:avLst/>
+          </a:prstGeom>
+          <a:noFill/>
+        </p:spPr>
+        <p:txBody>
+          <a:bodyPr wrap="square" lIns="0" tIns="0" rIns="0" bIns="0" rtlCol="0">
+            <a:spAutoFit/>
+          </a:bodyPr>
+          <a:lstStyle>
+            <a:defPPr>
+              <a:defRPr lang="en-US"/>
+            </a:defPPr>
+            <a:lvl1pPr algn="r">
+              <a:defRPr sz="1400">
+                <a:solidFill>
+                  <a:srgbClr val="0070C0"/>
+                </a:solidFill>
+              </a:defRPr>
+            </a:lvl1pPr>
+          </a:lstStyle>
+          <a:p>
+            <a:pPr algn="l"/>
+            <a:r>
+              <a:rPr lang="en-US" sz="1100" dirty="0" err="1">
+                <a:solidFill>
+                  <a:schemeClr val="accent6">
+                    <a:lumMod val="75000"/>
+                  </a:schemeClr>
+                </a:solidFill>
+              </a:rPr>
+              <a:t>getBackupStorageFilePath</a:t>
+            </a:r>
+            <a:r>
+              <a:rPr lang="en-US" sz="1100" dirty="0">
+                <a:solidFill>
+                  <a:schemeClr val="accent6">
+                    <a:lumMod val="75000"/>
+                  </a:schemeClr>
+                </a:solidFill>
+              </a:rPr>
+              <a:t>()</a:t>
+            </a:r>
+          </a:p>
+        </p:txBody>
+      </p:sp>
+      <p:sp>
+        <p:nvSpPr>
+          <p:cNvPr id="66" name="TextBox 65">
+            <a:extLst>
+              <a:ext uri="{FF2B5EF4-FFF2-40B4-BE49-F238E27FC236}">
+                <a16:creationId xmlns:a16="http://schemas.microsoft.com/office/drawing/2014/main" id="{6C674A5A-1546-4840-8E1A-453578582F8E}"/>
+              </a:ext>
+            </a:extLst>
+          </p:cNvPr>
+          <p:cNvSpPr txBox="1"/>
+          <p:nvPr/>
+        </p:nvSpPr>
+        <p:spPr>
+          <a:xfrm>
+            <a:off x="4232115" y="4603513"/>
+            <a:ext cx="1533302" cy="169277"/>
+          </a:xfrm>
+          <a:prstGeom prst="rect">
+            <a:avLst/>
+          </a:prstGeom>
+          <a:noFill/>
+        </p:spPr>
+        <p:txBody>
+          <a:bodyPr wrap="square" lIns="0" tIns="0" rIns="0" bIns="0" rtlCol="0">
+            <a:spAutoFit/>
+          </a:bodyPr>
+          <a:lstStyle>
+            <a:defPPr>
+              <a:defRPr lang="en-US"/>
+            </a:defPPr>
+            <a:lvl1pPr algn="r">
+              <a:defRPr sz="1400">
+                <a:solidFill>
+                  <a:srgbClr val="0070C0"/>
+                </a:solidFill>
+              </a:defRPr>
+            </a:lvl1pPr>
+          </a:lstStyle>
+          <a:p>
+            <a:pPr algn="l"/>
+            <a:r>
+              <a:rPr lang="en-US" sz="1100" dirty="0" err="1">
+                <a:solidFill>
+                  <a:schemeClr val="accent6">
+                    <a:lumMod val="75000"/>
+                  </a:schemeClr>
+                </a:solidFill>
+              </a:rPr>
+              <a:t>backupStoragePath:String</a:t>
+            </a:r>
+            <a:endParaRPr lang="en-US" sz="1100" dirty="0">
+              <a:solidFill>
+                <a:schemeClr val="accent6">
+                  <a:lumMod val="75000"/>
+                </a:schemeClr>
+              </a:solidFill>
+            </a:endParaRPr>
+          </a:p>
+        </p:txBody>
+      </p:sp>
+      <p:sp>
+        <p:nvSpPr>
+          <p:cNvPr id="68" name="Rectangle 67">
+            <a:extLst>
+              <a:ext uri="{FF2B5EF4-FFF2-40B4-BE49-F238E27FC236}">
+                <a16:creationId xmlns:a16="http://schemas.microsoft.com/office/drawing/2014/main" id="{FD9B5B56-4348-4A47-A361-552ADEAEA683}"/>
+              </a:ext>
+            </a:extLst>
+          </p:cNvPr>
+          <p:cNvSpPr/>
+          <p:nvPr/>
+        </p:nvSpPr>
+        <p:spPr>
+          <a:xfrm>
+            <a:off x="3618740" y="4945693"/>
+            <a:ext cx="233779" cy="666117"/>
+          </a:xfrm>
+          <a:prstGeom prst="rect">
+            <a:avLst/>
+          </a:prstGeom>
+          <a:solidFill>
+            <a:srgbClr val="E46C0A"/>
+          </a:solidFill>
+          <a:ln>
+            <a:solidFill>
+              <a:schemeClr val="accent6">
+                <a:lumMod val="50000"/>
+              </a:schemeClr>
+            </a:solidFill>
+          </a:ln>
+          <a:effectLst/>
+        </p:spPr>
+        <p:style>
+          <a:lnRef idx="1">
+            <a:schemeClr val="accent3"/>
+          </a:lnRef>
+          <a:fillRef idx="2">
+            <a:schemeClr val="accent3"/>
+          </a:fillRef>
+          <a:effectRef idx="1">
+            <a:schemeClr val="accent3"/>
+          </a:effectRef>
+          <a:fontRef idx="minor">
+            <a:schemeClr val="dk1"/>
+          </a:fontRef>
+        </p:style>
+        <p:txBody>
+          <a:bodyPr rtlCol="0" anchor="ctr"/>
+          <a:lstStyle/>
+          <a:p>
+            <a:pPr algn="ctr"/>
+            <a:endParaRPr lang="en-SG" sz="1400" dirty="0">
+              <a:solidFill>
+                <a:schemeClr val="accent6">
+                  <a:lumMod val="75000"/>
+                </a:schemeClr>
+              </a:solidFill>
+            </a:endParaRPr>
+          </a:p>
+        </p:txBody>
+      </p:sp>
+      <p:cxnSp>
+        <p:nvCxnSpPr>
+          <p:cNvPr id="71" name="Straight Arrow Connector 117">
+            <a:extLst>
+              <a:ext uri="{FF2B5EF4-FFF2-40B4-BE49-F238E27FC236}">
+                <a16:creationId xmlns:a16="http://schemas.microsoft.com/office/drawing/2014/main" id="{18D4BC25-9ADD-42CB-A4CB-5C8A1C73B15E}"/>
+              </a:ext>
+            </a:extLst>
+          </p:cNvPr>
+          <p:cNvCxnSpPr>
+            <a:cxnSpLocks/>
+          </p:cNvCxnSpPr>
+          <p:nvPr/>
+        </p:nvCxnSpPr>
+        <p:spPr>
+          <a:xfrm rot="10800000" flipV="1">
+            <a:off x="3674418" y="5611811"/>
+            <a:ext cx="170923" cy="87458"/>
+          </a:xfrm>
+          <a:prstGeom prst="curvedConnector3">
+            <a:avLst>
+              <a:gd name="adj1" fmla="val -179405"/>
+            </a:avLst>
+          </a:prstGeom>
+          <a:ln w="19050">
+            <a:solidFill>
+              <a:srgbClr val="E46C0A"/>
+            </a:solidFill>
+            <a:prstDash val="dash"/>
+            <a:tailEnd type="arrow"/>
+          </a:ln>
+        </p:spPr>
+        <p:style>
+          <a:lnRef idx="1">
+            <a:schemeClr val="accent1"/>
+          </a:lnRef>
+          <a:fillRef idx="0">
+            <a:schemeClr val="accent1"/>
+          </a:fillRef>
+          <a:effectRef idx="0">
+            <a:schemeClr val="accent1"/>
+          </a:effectRef>
+          <a:fontRef idx="minor">
+            <a:schemeClr val="tx1"/>
+          </a:fontRef>
+        </p:style>
+      </p:cxnSp>
+      <p:cxnSp>
+        <p:nvCxnSpPr>
+          <p:cNvPr id="75" name="Straight Arrow Connector 117">
+            <a:extLst>
+              <a:ext uri="{FF2B5EF4-FFF2-40B4-BE49-F238E27FC236}">
+                <a16:creationId xmlns:a16="http://schemas.microsoft.com/office/drawing/2014/main" id="{4FFFAD43-1BAB-48AD-9014-C9D3E23D462A}"/>
+              </a:ext>
+            </a:extLst>
+          </p:cNvPr>
+          <p:cNvCxnSpPr>
+            <a:cxnSpLocks/>
+          </p:cNvCxnSpPr>
+          <p:nvPr/>
+        </p:nvCxnSpPr>
+        <p:spPr>
+          <a:xfrm>
+            <a:off x="3694387" y="4871749"/>
+            <a:ext cx="155953" cy="97385"/>
+          </a:xfrm>
+          <a:prstGeom prst="curvedConnector3">
+            <a:avLst>
+              <a:gd name="adj1" fmla="val 320615"/>
+            </a:avLst>
+          </a:prstGeom>
+          <a:ln w="19050">
+            <a:solidFill>
+              <a:srgbClr val="E46C0A"/>
+            </a:solidFill>
+            <a:tailEnd type="arrow"/>
+          </a:ln>
+        </p:spPr>
+        <p:style>
+          <a:lnRef idx="1">
+            <a:schemeClr val="accent1"/>
+          </a:lnRef>
+          <a:fillRef idx="0">
+            <a:schemeClr val="accent1"/>
+          </a:fillRef>
+          <a:effectRef idx="0">
+            <a:schemeClr val="accent1"/>
+          </a:effectRef>
+          <a:fontRef idx="minor">
+            <a:schemeClr val="tx1"/>
+          </a:fontRef>
+        </p:style>
+      </p:cxnSp>
+      <p:sp>
+        <p:nvSpPr>
+          <p:cNvPr id="76" name="TextBox 75">
+            <a:extLst>
+              <a:ext uri="{FF2B5EF4-FFF2-40B4-BE49-F238E27FC236}">
+                <a16:creationId xmlns:a16="http://schemas.microsoft.com/office/drawing/2014/main" id="{3EBC0E98-732B-42C1-BA11-9A973C1E4C66}"/>
+              </a:ext>
+            </a:extLst>
+          </p:cNvPr>
+          <p:cNvSpPr txBox="1"/>
+          <p:nvPr/>
+        </p:nvSpPr>
+        <p:spPr>
+          <a:xfrm>
+            <a:off x="4238775" y="4856453"/>
+            <a:ext cx="3053283" cy="169277"/>
+          </a:xfrm>
+          <a:prstGeom prst="rect">
+            <a:avLst/>
+          </a:prstGeom>
+          <a:noFill/>
+        </p:spPr>
+        <p:txBody>
+          <a:bodyPr wrap="square" lIns="0" tIns="0" rIns="0" bIns="0" rtlCol="0">
+            <a:spAutoFit/>
+          </a:bodyPr>
+          <a:lstStyle>
+            <a:defPPr>
+              <a:defRPr lang="en-US"/>
+            </a:defPPr>
+            <a:lvl1pPr algn="r">
+              <a:defRPr sz="1400">
+                <a:solidFill>
+                  <a:srgbClr val="0070C0"/>
+                </a:solidFill>
+              </a:defRPr>
+            </a:lvl1pPr>
+          </a:lstStyle>
+          <a:p>
+            <a:pPr algn="l"/>
+            <a:r>
+              <a:rPr lang="en-US" sz="1100" dirty="0" err="1">
+                <a:solidFill>
+                  <a:schemeClr val="accent6">
+                    <a:lumMod val="75000"/>
+                  </a:schemeClr>
+                </a:solidFill>
+              </a:rPr>
+              <a:t>saveAddressBook</a:t>
+            </a:r>
+            <a:r>
+              <a:rPr lang="en-US" sz="1100" dirty="0">
+                <a:solidFill>
+                  <a:schemeClr val="accent6">
+                    <a:lumMod val="75000"/>
+                  </a:schemeClr>
+                </a:solidFill>
+              </a:rPr>
+              <a:t>(</a:t>
+            </a:r>
+            <a:r>
+              <a:rPr lang="en-US" sz="1100" dirty="0" err="1">
+                <a:solidFill>
+                  <a:schemeClr val="accent6">
+                    <a:lumMod val="75000"/>
+                  </a:schemeClr>
+                </a:solidFill>
+              </a:rPr>
+              <a:t>addressBook</a:t>
+            </a:r>
+            <a:r>
+              <a:rPr lang="en-US" sz="1100" dirty="0">
+                <a:solidFill>
+                  <a:schemeClr val="accent6">
+                    <a:lumMod val="75000"/>
+                  </a:schemeClr>
+                </a:solidFill>
+              </a:rPr>
+              <a:t>, </a:t>
+            </a:r>
+            <a:r>
+              <a:rPr lang="en-US" sz="1100" dirty="0" err="1">
+                <a:solidFill>
+                  <a:schemeClr val="accent6">
+                    <a:lumMod val="75000"/>
+                  </a:schemeClr>
+                </a:solidFill>
+              </a:rPr>
+              <a:t>backupStoragePath</a:t>
+            </a:r>
+            <a:r>
+              <a:rPr lang="en-US" sz="1100" dirty="0">
+                <a:solidFill>
+                  <a:schemeClr val="accent6">
+                    <a:lumMod val="75000"/>
+                  </a:schemeClr>
+                </a:solidFill>
+              </a:rPr>
+              <a:t>)</a:t>
+            </a:r>
+          </a:p>
+        </p:txBody>
+      </p:sp>
+      <p:sp>
+        <p:nvSpPr>
+          <p:cNvPr id="2" name="Rectangle 62"/>
+          <p:cNvSpPr/>
+          <p:nvPr/>
+        </p:nvSpPr>
+        <p:spPr>
+          <a:xfrm>
+            <a:off x="2559545" y="743348"/>
+            <a:ext cx="1631455" cy="275921"/>
+          </a:xfrm>
+          <a:prstGeom prst="rect">
+            <a:avLst/>
+          </a:prstGeom>
+          <a:solidFill>
+            <a:srgbClr val="E46C0A"/>
+          </a:solidFill>
+          <a:ln w="19050">
+            <a:solidFill>
+              <a:schemeClr val="accent6">
+                <a:lumMod val="50000"/>
+              </a:schemeClr>
+            </a:solidFill>
+          </a:ln>
+          <a:effectLst/>
+        </p:spPr>
+        <p:style>
+          <a:lnRef idx="1">
+            <a:schemeClr val="accent2"/>
+          </a:lnRef>
+          <a:fillRef idx="2">
+            <a:schemeClr val="accent2"/>
+          </a:fillRef>
+          <a:effectRef idx="1">
+            <a:schemeClr val="accent2"/>
+          </a:effectRef>
+          <a:fontRef idx="minor">
+            <a:schemeClr val="dk1"/>
+          </a:fontRef>
+        </p:style>
+        <p:txBody>
+          <a:bodyPr rtlCol="0" anchor="ctr"/>
+          <a:lstStyle/>
+          <a:p>
+            <a:pPr algn="ctr"/>
+            <a:r>
+              <a:rPr lang="en-US" sz="1200" dirty="0">
+                <a:solidFill>
+                  <a:schemeClr val="bg1"/>
+                </a:solidFill>
+              </a:rPr>
+              <a:t>:</a:t>
+            </a:r>
+            <a:r>
+              <a:rPr lang="en-US" sz="1200" dirty="0" err="1">
+                <a:solidFill>
+                  <a:schemeClr val="bg1"/>
+                </a:solidFill>
+              </a:rPr>
+              <a:t>StorageManager</a:t>
+            </a:r>
+            <a:endParaRPr lang="en-SG" sz="1200" dirty="0">
+              <a:solidFill>
+                <a:schemeClr val="bg1"/>
+              </a:solidFill>
+            </a:endParaRPr>
+          </a:p>
+        </p:txBody>
+      </p:sp>
     </p:spTree>
     <p:extLst>
       <p:ext uri="{BB962C8B-B14F-4D97-AF65-F5344CB8AC3E}">

</xml_diff>

<commit_message>
final draft of backup mechanism
</commit_message>
<xml_diff>
--- a/docs/diagrams/BackupSequenceDiagram.pptx
+++ b/docs/diagrams/BackupSequenceDiagram.pptx
@@ -212,7 +212,7 @@
           <a:p>
             <a:fld id="{F5CC4B3F-88C1-4FFA-B1B6-F41C21DC6924}" type="datetimeFigureOut">
               <a:rPr lang="en-US" smtClean="0"/>
-              <a:t>11/12/2017</a:t>
+              <a:t>11/13/2017</a:t>
             </a:fld>
             <a:endParaRPr lang="en-US"/>
           </a:p>
@@ -658,7 +658,7 @@
           <a:p>
             <a:fld id="{78C97017-6FC3-485B-9764-EAC9E56C1D49}" type="datetimeFigureOut">
               <a:rPr lang="en-US" smtClean="0"/>
-              <a:t>11/12/2017</a:t>
+              <a:t>11/13/2017</a:t>
             </a:fld>
             <a:endParaRPr lang="en-US"/>
           </a:p>
@@ -826,7 +826,7 @@
           <a:p>
             <a:fld id="{78C97017-6FC3-485B-9764-EAC9E56C1D49}" type="datetimeFigureOut">
               <a:rPr lang="en-US" smtClean="0"/>
-              <a:t>11/12/2017</a:t>
+              <a:t>11/13/2017</a:t>
             </a:fld>
             <a:endParaRPr lang="en-US"/>
           </a:p>
@@ -1004,7 +1004,7 @@
           <a:p>
             <a:fld id="{78C97017-6FC3-485B-9764-EAC9E56C1D49}" type="datetimeFigureOut">
               <a:rPr lang="en-US" smtClean="0"/>
-              <a:t>11/12/2017</a:t>
+              <a:t>11/13/2017</a:t>
             </a:fld>
             <a:endParaRPr lang="en-US"/>
           </a:p>
@@ -1172,7 +1172,7 @@
           <a:p>
             <a:fld id="{78C97017-6FC3-485B-9764-EAC9E56C1D49}" type="datetimeFigureOut">
               <a:rPr lang="en-US" smtClean="0"/>
-              <a:t>11/12/2017</a:t>
+              <a:t>11/13/2017</a:t>
             </a:fld>
             <a:endParaRPr lang="en-US"/>
           </a:p>
@@ -1417,7 +1417,7 @@
           <a:p>
             <a:fld id="{78C97017-6FC3-485B-9764-EAC9E56C1D49}" type="datetimeFigureOut">
               <a:rPr lang="en-US" smtClean="0"/>
-              <a:t>11/12/2017</a:t>
+              <a:t>11/13/2017</a:t>
             </a:fld>
             <a:endParaRPr lang="en-US"/>
           </a:p>
@@ -1702,7 +1702,7 @@
           <a:p>
             <a:fld id="{78C97017-6FC3-485B-9764-EAC9E56C1D49}" type="datetimeFigureOut">
               <a:rPr lang="en-US" smtClean="0"/>
-              <a:t>11/12/2017</a:t>
+              <a:t>11/13/2017</a:t>
             </a:fld>
             <a:endParaRPr lang="en-US"/>
           </a:p>
@@ -2121,7 +2121,7 @@
           <a:p>
             <a:fld id="{78C97017-6FC3-485B-9764-EAC9E56C1D49}" type="datetimeFigureOut">
               <a:rPr lang="en-US" smtClean="0"/>
-              <a:t>11/12/2017</a:t>
+              <a:t>11/13/2017</a:t>
             </a:fld>
             <a:endParaRPr lang="en-US"/>
           </a:p>
@@ -2238,7 +2238,7 @@
           <a:p>
             <a:fld id="{78C97017-6FC3-485B-9764-EAC9E56C1D49}" type="datetimeFigureOut">
               <a:rPr lang="en-US" smtClean="0"/>
-              <a:t>11/12/2017</a:t>
+              <a:t>11/13/2017</a:t>
             </a:fld>
             <a:endParaRPr lang="en-US"/>
           </a:p>
@@ -2333,7 +2333,7 @@
           <a:p>
             <a:fld id="{78C97017-6FC3-485B-9764-EAC9E56C1D49}" type="datetimeFigureOut">
               <a:rPr lang="en-US" smtClean="0"/>
-              <a:t>11/12/2017</a:t>
+              <a:t>11/13/2017</a:t>
             </a:fld>
             <a:endParaRPr lang="en-US"/>
           </a:p>
@@ -2608,7 +2608,7 @@
           <a:p>
             <a:fld id="{78C97017-6FC3-485B-9764-EAC9E56C1D49}" type="datetimeFigureOut">
               <a:rPr lang="en-US" smtClean="0"/>
-              <a:t>11/12/2017</a:t>
+              <a:t>11/13/2017</a:t>
             </a:fld>
             <a:endParaRPr lang="en-US"/>
           </a:p>
@@ -2860,7 +2860,7 @@
           <a:p>
             <a:fld id="{78C97017-6FC3-485B-9764-EAC9E56C1D49}" type="datetimeFigureOut">
               <a:rPr lang="en-US" smtClean="0"/>
-              <a:t>11/12/2017</a:t>
+              <a:t>11/13/2017</a:t>
             </a:fld>
             <a:endParaRPr lang="en-US"/>
           </a:p>
@@ -3071,7 +3071,7 @@
           <a:p>
             <a:fld id="{78C97017-6FC3-485B-9764-EAC9E56C1D49}" type="datetimeFigureOut">
               <a:rPr lang="en-US" smtClean="0"/>
-              <a:t>11/12/2017</a:t>
+              <a:t>11/13/2017</a:t>
             </a:fld>
             <a:endParaRPr lang="en-US"/>
           </a:p>
@@ -3855,7 +3855,7 @@
         <p:spPr>
           <a:xfrm>
             <a:off x="5910128" y="923417"/>
-            <a:ext cx="0" cy="2072674"/>
+            <a:ext cx="0" cy="1551142"/>
           </a:xfrm>
           <a:prstGeom prst="line">
             <a:avLst/>
@@ -3892,7 +3892,7 @@
         <p:spPr>
           <a:xfrm>
             <a:off x="5790238" y="1962905"/>
-            <a:ext cx="222832" cy="878142"/>
+            <a:ext cx="222832" cy="398560"/>
           </a:xfrm>
           <a:prstGeom prst="rect">
             <a:avLst/>
@@ -4028,9 +4028,9 @@
           <p:nvPr/>
         </p:nvCxnSpPr>
         <p:spPr>
-          <a:xfrm>
-            <a:off x="3571436" y="2838468"/>
-            <a:ext cx="2330218" cy="2579"/>
+          <a:xfrm flipV="1">
+            <a:off x="3571436" y="2361465"/>
+            <a:ext cx="2330218" cy="1783"/>
           </a:xfrm>
           <a:prstGeom prst="straightConnector1">
             <a:avLst/>
@@ -4224,8 +4224,8 @@
         </p:nvSpPr>
         <p:spPr>
           <a:xfrm>
-            <a:off x="2281032" y="1655144"/>
-            <a:ext cx="5719967" cy="4388483"/>
+            <a:off x="2281032" y="2630854"/>
+            <a:ext cx="5719967" cy="3412774"/>
           </a:xfrm>
           <a:prstGeom prst="rect">
             <a:avLst/>
@@ -4278,7 +4278,7 @@
         </p:nvSpPr>
         <p:spPr>
           <a:xfrm rot="10800000" flipH="1">
-            <a:off x="2293477" y="1651137"/>
+            <a:off x="2280058" y="2629856"/>
             <a:ext cx="457199" cy="275919"/>
           </a:xfrm>
           <a:prstGeom prst="snip1Rect">
@@ -4332,7 +4332,7 @@
         </p:nvSpPr>
         <p:spPr>
           <a:xfrm>
-            <a:off x="2404943" y="1679125"/>
+            <a:off x="2391524" y="2657844"/>
             <a:ext cx="336933" cy="215444"/>
           </a:xfrm>
           <a:prstGeom prst="rect">
@@ -4748,7 +4748,7 @@
         </p:nvSpPr>
         <p:spPr>
           <a:xfrm>
-            <a:off x="3593746" y="2640267"/>
+            <a:off x="3457705" y="2149795"/>
             <a:ext cx="1767758" cy="169277"/>
           </a:xfrm>
           <a:prstGeom prst="rect">
@@ -5864,6 +5864,79 @@
                 <a:schemeClr val="bg1"/>
               </a:solidFill>
             </a:endParaRPr>
+          </a:p>
+        </p:txBody>
+      </p:sp>
+      <p:sp>
+        <p:nvSpPr>
+          <p:cNvPr id="51" name="TextBox 50">
+            <a:extLst>
+              <a:ext uri="{FF2B5EF4-FFF2-40B4-BE49-F238E27FC236}">
+                <a16:creationId xmlns:a16="http://schemas.microsoft.com/office/drawing/2014/main" id="{04F0D732-EDE1-437B-AEC5-E317E3BD3828}"/>
+              </a:ext>
+            </a:extLst>
+          </p:cNvPr>
+          <p:cNvSpPr txBox="1"/>
+          <p:nvPr/>
+        </p:nvSpPr>
+        <p:spPr>
+          <a:xfrm>
+            <a:off x="4191000" y="2677492"/>
+            <a:ext cx="2759858" cy="184666"/>
+          </a:xfrm>
+          <a:prstGeom prst="rect">
+            <a:avLst/>
+          </a:prstGeom>
+          <a:noFill/>
+        </p:spPr>
+        <p:txBody>
+          <a:bodyPr wrap="square" lIns="0" tIns="0" rIns="0" bIns="0" rtlCol="0">
+            <a:spAutoFit/>
+          </a:bodyPr>
+          <a:lstStyle>
+            <a:defPPr>
+              <a:defRPr lang="en-US"/>
+            </a:defPPr>
+            <a:lvl1pPr algn="r">
+              <a:defRPr sz="1400">
+                <a:solidFill>
+                  <a:srgbClr val="0070C0"/>
+                </a:solidFill>
+              </a:defRPr>
+            </a:lvl1pPr>
+          </a:lstStyle>
+          <a:p>
+            <a:pPr algn="l"/>
+            <a:r>
+              <a:rPr lang="en-US" sz="1200" dirty="0">
+                <a:solidFill>
+                  <a:schemeClr val="accent6">
+                    <a:lumMod val="50000"/>
+                  </a:schemeClr>
+                </a:solidFill>
+              </a:rPr>
+              <a:t>[</a:t>
+            </a:r>
+            <a:r>
+              <a:rPr lang="en-US" sz="1200" dirty="0" err="1">
+                <a:solidFill>
+                  <a:schemeClr val="accent6">
+                    <a:lumMod val="50000"/>
+                  </a:schemeClr>
+                </a:solidFill>
+              </a:rPr>
+              <a:t>addressBookOptional.isPresent</a:t>
+            </a:r>
+            <a:r>
+              <a:rPr lang="en-US" sz="1200" dirty="0">
+                <a:solidFill>
+                  <a:schemeClr val="accent6">
+                    <a:lumMod val="50000"/>
+                  </a:schemeClr>
+                </a:solidFill>
+              </a:rPr>
+              <a:t>()]</a:t>
+            </a:r>
           </a:p>
         </p:txBody>
       </p:sp>

</xml_diff>